<commit_message>
more fixes to powerpoint
</commit_message>
<xml_diff>
--- a/DFC3.pptx
+++ b/DFC3.pptx
@@ -14920,8 +14920,15 @@
             </a:r>
             <a:r>
               <a:rPr lang="en-US" dirty="0" smtClean="0"/>
-              <a:t>.” – Richard Mansfield</a:t>
-            </a:r>
+              <a:t>.” – Richard </a:t>
+            </a:r>
+            <a:r>
+              <a:rPr lang="en-US" dirty="0" smtClean="0"/>
+              <a:t>Mansfield</a:t>
+            </a:r>
+          </a:p>
+          <a:p>
+            <a:endParaRPr lang="en-US" dirty="0" smtClean="0"/>
           </a:p>
           <a:p>
             <a:r>
@@ -18697,14 +18704,24 @@
               <a:t> </a:t>
             </a:r>
             <a:r>
-              <a:rPr lang="en-US" sz="1400" smtClean="0">
-                <a:solidFill>
-                  <a:schemeClr val="bg1"/>
-                </a:solidFill>
-                <a:latin typeface="Consolas" panose="020B0609020204030204" pitchFamily="49" charset="0"/>
-                <a:cs typeface="Consolas" panose="020B0609020204030204" pitchFamily="49" charset="0"/>
-              </a:rPr>
-              <a:t>datapool)</a:t>
+              <a:rPr lang="en-US" sz="1400" dirty="0" err="1" smtClean="0">
+                <a:solidFill>
+                  <a:schemeClr val="bg1"/>
+                </a:solidFill>
+                <a:latin typeface="Consolas" panose="020B0609020204030204" pitchFamily="49" charset="0"/>
+                <a:cs typeface="Consolas" panose="020B0609020204030204" pitchFamily="49" charset="0"/>
+              </a:rPr>
+              <a:t>datapool</a:t>
+            </a:r>
+            <a:r>
+              <a:rPr lang="en-US" sz="1400" dirty="0" smtClean="0">
+                <a:solidFill>
+                  <a:schemeClr val="bg1"/>
+                </a:solidFill>
+                <a:latin typeface="Consolas" panose="020B0609020204030204" pitchFamily="49" charset="0"/>
+                <a:cs typeface="Consolas" panose="020B0609020204030204" pitchFamily="49" charset="0"/>
+              </a:rPr>
+              <a:t>)</a:t>
             </a:r>
             <a:endParaRPr lang="en-US" sz="1400" dirty="0">
               <a:solidFill>
@@ -22663,7 +22680,15 @@
             </a:r>
             <a:r>
               <a:rPr lang="en-US" dirty="0" smtClean="0"/>
-              <a:t>best practice design </a:t>
+              <a:t>best practice Object Oriented </a:t>
+            </a:r>
+            <a:r>
+              <a:rPr lang="en-US" dirty="0" smtClean="0"/>
+              <a:t>Programming </a:t>
+            </a:r>
+            <a:r>
+              <a:rPr lang="en-US" dirty="0" smtClean="0"/>
+              <a:t>design </a:t>
             </a:r>
             <a:r>
               <a:rPr lang="en-US" dirty="0" smtClean="0"/>
@@ -22717,7 +22742,7 @@
             </a:r>
             <a:r>
               <a:rPr lang="en-US" dirty="0" smtClean="0"/>
-              <a:t>functions can access is the API, these issues don’t happen</a:t>
+              <a:t>functions can access is the API, these issues are mitigated</a:t>
             </a:r>
             <a:endParaRPr lang="en-US" dirty="0" smtClean="0"/>
           </a:p>
@@ -29811,15 +29836,8 @@
                 <a:latin typeface="Consolas" panose="020B0609020204030204" pitchFamily="49" charset="0"/>
                 <a:cs typeface="Consolas" panose="020B0609020204030204" pitchFamily="49" charset="0"/>
               </a:rPr>
-              <a:t>-type ;specify type of message to handle</a:t>
-            </a:r>
-            <a:endParaRPr lang="en-US" sz="1400" dirty="0">
-              <a:solidFill>
-                <a:schemeClr val="bg1"/>
-              </a:solidFill>
-              <a:latin typeface="Consolas" panose="020B0609020204030204" pitchFamily="49" charset="0"/>
-              <a:cs typeface="Consolas" panose="020B0609020204030204" pitchFamily="49" charset="0"/>
-            </a:endParaRPr>
+              <a:t>-type</a:t>
+            </a:r>
           </a:p>
           <a:p>
             <a:pPr marL="0" indent="0">
@@ -29839,35 +29857,8 @@
                 <a:latin typeface="Consolas" panose="020B0609020204030204" pitchFamily="49" charset="0"/>
                 <a:cs typeface="Consolas" panose="020B0609020204030204" pitchFamily="49" charset="0"/>
               </a:rPr>
-              <a:t>                                </a:t>
-            </a:r>
-            <a:r>
-              <a:rPr lang="en-US" sz="1400" dirty="0">
-                <a:solidFill>
-                  <a:schemeClr val="bg1"/>
-                </a:solidFill>
-                <a:latin typeface="Consolas" panose="020B0609020204030204" pitchFamily="49" charset="0"/>
-                <a:cs typeface="Consolas" panose="020B0609020204030204" pitchFamily="49" charset="0"/>
-              </a:rPr>
-              <a:t>#</a:t>
-            </a:r>
-            <a:r>
-              <a:rPr lang="en-US" sz="1400" dirty="0" smtClean="0">
-                <a:solidFill>
-                  <a:schemeClr val="bg1"/>
-                </a:solidFill>
-                <a:latin typeface="Consolas" panose="020B0609020204030204" pitchFamily="49" charset="0"/>
-                <a:cs typeface="Consolas" panose="020B0609020204030204" pitchFamily="49" charset="0"/>
-              </a:rPr>
-              <a:t>f ;specify only handle messages with source set to #f</a:t>
-            </a:r>
-            <a:endParaRPr lang="en-US" sz="1400" dirty="0">
-              <a:solidFill>
-                <a:schemeClr val="bg1"/>
-              </a:solidFill>
-              <a:latin typeface="Consolas" panose="020B0609020204030204" pitchFamily="49" charset="0"/>
-              <a:cs typeface="Consolas" panose="020B0609020204030204" pitchFamily="49" charset="0"/>
-            </a:endParaRPr>
+              <a:t>                                #f </a:t>
+            </a:r>
           </a:p>
           <a:p>
             <a:pPr marL="0" indent="0">
@@ -29907,7 +29898,7 @@
                 <a:latin typeface="Consolas" panose="020B0609020204030204" pitchFamily="49" charset="0"/>
                 <a:cs typeface="Consolas" panose="020B0609020204030204" pitchFamily="49" charset="0"/>
               </a:rPr>
-              <a:t>)) ;list of input to gather from </a:t>
+              <a:t>)) ;input to gather from </a:t>
             </a:r>
             <a:r>
               <a:rPr lang="en-US" sz="1400" dirty="0" err="1" smtClean="0">
@@ -29965,17 +29956,17 @@
                 <a:latin typeface="Consolas" panose="020B0609020204030204" pitchFamily="49" charset="0"/>
                 <a:cs typeface="Consolas" panose="020B0609020204030204" pitchFamily="49" charset="0"/>
               </a:rPr>
-              <a:t>))) </a:t>
-            </a:r>
-            <a:r>
-              <a:rPr lang="en-US" sz="1400" dirty="0">
-                <a:solidFill>
-                  <a:schemeClr val="bg1"/>
-                </a:solidFill>
-                <a:latin typeface="Consolas" panose="020B0609020204030204" pitchFamily="49" charset="0"/>
-                <a:cs typeface="Consolas" panose="020B0609020204030204" pitchFamily="49" charset="0"/>
-              </a:rPr>
-              <a:t>;specify return destinations </a:t>
+              <a:t>))) ;return </a:t>
+            </a:r>
+            <a:r>
+              <a:rPr lang="en-US" sz="1400" dirty="0">
+                <a:solidFill>
+                  <a:schemeClr val="bg1"/>
+                </a:solidFill>
+                <a:latin typeface="Consolas" panose="020B0609020204030204" pitchFamily="49" charset="0"/>
+                <a:cs typeface="Consolas" panose="020B0609020204030204" pitchFamily="49" charset="0"/>
+              </a:rPr>
+              <a:t>destinations </a:t>
             </a:r>
           </a:p>
           <a:p>
@@ -34807,28 +34798,28 @@
             </a:r>
             <a:r>
               <a:rPr lang="en-US" dirty="0" smtClean="0"/>
-              <a:t>necessary when:</a:t>
+              <a:t>necessary to:</a:t>
             </a:r>
           </a:p>
           <a:p>
             <a:pPr lvl="1"/>
             <a:r>
               <a:rPr lang="en-US" dirty="0" smtClean="0"/>
-              <a:t>to enable communication</a:t>
+              <a:t>enable communication</a:t>
             </a:r>
           </a:p>
           <a:p>
             <a:pPr lvl="1"/>
             <a:r>
               <a:rPr lang="en-US" dirty="0" smtClean="0"/>
-              <a:t>to make programs event driven</a:t>
+              <a:t>make programs event driven</a:t>
             </a:r>
           </a:p>
           <a:p>
             <a:pPr lvl="1"/>
             <a:r>
               <a:rPr lang="en-US" dirty="0" smtClean="0"/>
-              <a:t>to make</a:t>
+              <a:t>make</a:t>
             </a:r>
             <a:r>
               <a:rPr lang="en-US" dirty="0" smtClean="0"/>
@@ -34839,18 +34830,18 @@
           <a:p>
             <a:r>
               <a:rPr lang="en-US" dirty="0" smtClean="0"/>
-              <a:t>Traditional concurrency techniques have problems:</a:t>
+              <a:t>Traditional concurrency techniques have problems, they:</a:t>
             </a:r>
           </a:p>
           <a:p>
             <a:pPr lvl="1"/>
             <a:r>
               <a:rPr lang="en-US" dirty="0" smtClean="0"/>
-              <a:t>they </a:t>
+              <a:t>are </a:t>
             </a:r>
             <a:r>
               <a:rPr lang="en-US" dirty="0" smtClean="0"/>
-              <a:t>are error </a:t>
+              <a:t>error </a:t>
             </a:r>
             <a:r>
               <a:rPr lang="en-US" dirty="0" smtClean="0"/>

</xml_diff>

<commit_message>
more fixes to powerpoint again
</commit_message>
<xml_diff>
--- a/DFC3.pptx
+++ b/DFC3.pptx
@@ -16,30 +16,31 @@
     <p:sldId id="257" r:id="rId10"/>
     <p:sldId id="260" r:id="rId11"/>
     <p:sldId id="261" r:id="rId12"/>
-    <p:sldId id="262" r:id="rId13"/>
-    <p:sldId id="268" r:id="rId14"/>
-    <p:sldId id="270" r:id="rId15"/>
-    <p:sldId id="271" r:id="rId16"/>
-    <p:sldId id="272" r:id="rId17"/>
-    <p:sldId id="269" r:id="rId18"/>
-    <p:sldId id="273" r:id="rId19"/>
-    <p:sldId id="274" r:id="rId20"/>
-    <p:sldId id="275" r:id="rId21"/>
-    <p:sldId id="277" r:id="rId22"/>
-    <p:sldId id="276" r:id="rId23"/>
-    <p:sldId id="290" r:id="rId24"/>
-    <p:sldId id="278" r:id="rId25"/>
-    <p:sldId id="279" r:id="rId26"/>
-    <p:sldId id="281" r:id="rId27"/>
-    <p:sldId id="282" r:id="rId28"/>
-    <p:sldId id="283" r:id="rId29"/>
-    <p:sldId id="284" r:id="rId30"/>
-    <p:sldId id="285" r:id="rId31"/>
-    <p:sldId id="291" r:id="rId32"/>
-    <p:sldId id="288" r:id="rId33"/>
-    <p:sldId id="289" r:id="rId34"/>
-    <p:sldId id="287" r:id="rId35"/>
-    <p:sldId id="280" r:id="rId36"/>
+    <p:sldId id="292" r:id="rId13"/>
+    <p:sldId id="262" r:id="rId14"/>
+    <p:sldId id="268" r:id="rId15"/>
+    <p:sldId id="270" r:id="rId16"/>
+    <p:sldId id="271" r:id="rId17"/>
+    <p:sldId id="272" r:id="rId18"/>
+    <p:sldId id="269" r:id="rId19"/>
+    <p:sldId id="273" r:id="rId20"/>
+    <p:sldId id="274" r:id="rId21"/>
+    <p:sldId id="275" r:id="rId22"/>
+    <p:sldId id="277" r:id="rId23"/>
+    <p:sldId id="276" r:id="rId24"/>
+    <p:sldId id="290" r:id="rId25"/>
+    <p:sldId id="278" r:id="rId26"/>
+    <p:sldId id="279" r:id="rId27"/>
+    <p:sldId id="281" r:id="rId28"/>
+    <p:sldId id="282" r:id="rId29"/>
+    <p:sldId id="283" r:id="rId30"/>
+    <p:sldId id="284" r:id="rId31"/>
+    <p:sldId id="285" r:id="rId32"/>
+    <p:sldId id="291" r:id="rId33"/>
+    <p:sldId id="288" r:id="rId34"/>
+    <p:sldId id="289" r:id="rId35"/>
+    <p:sldId id="287" r:id="rId36"/>
+    <p:sldId id="280" r:id="rId37"/>
   </p:sldIdLst>
   <p:sldSz cx="12192000" cy="6858000"/>
   <p:notesSz cx="6858000" cy="9144000"/>
@@ -13043,8 +13044,16 @@
             </a:r>
             <a:r>
               <a:rPr lang="en-US" dirty="0" smtClean="0"/>
-              <a:t>-equals-true)</a:t>
-            </a:r>
+              <a:t>-equals-true</a:t>
+            </a:r>
+            <a:r>
+              <a:rPr lang="en-US" dirty="0" smtClean="0"/>
+              <a:t>)</a:t>
+            </a:r>
+          </a:p>
+          <a:p>
+            <a:pPr lvl="1"/>
+            <a:endParaRPr lang="en-US" dirty="0" smtClean="0"/>
           </a:p>
         </p:txBody>
       </p:sp>
@@ -13275,7 +13284,7 @@
           <a:p>
             <a:r>
               <a:rPr lang="en-US" dirty="0" smtClean="0"/>
-              <a:t>Putting it together</a:t>
+              <a:t>Readability</a:t>
             </a:r>
             <a:endParaRPr lang="en-US" dirty="0"/>
           </a:p>
@@ -13298,7 +13307,369 @@
           <a:p>
             <a:r>
               <a:rPr lang="en-US" dirty="0" smtClean="0"/>
-              <a:t>An example:</a:t>
+              <a:t>Whitespace is ignored in lisp</a:t>
+            </a:r>
+          </a:p>
+          <a:p>
+            <a:r>
+              <a:rPr lang="en-US" dirty="0" smtClean="0"/>
+              <a:t>Newlines can be added to make lines more readable</a:t>
+            </a:r>
+          </a:p>
+          <a:p>
+            <a:pPr lvl="1"/>
+            <a:r>
+              <a:rPr lang="en-US" dirty="0" smtClean="0"/>
+              <a:t>(define variable1 #f)</a:t>
+            </a:r>
+            <a:br>
+              <a:rPr lang="en-US" dirty="0" smtClean="0"/>
+            </a:br>
+            <a:r>
+              <a:rPr lang="en-US" dirty="0" smtClean="0"/>
+              <a:t>(define variable2 (list 1 2))</a:t>
+            </a:r>
+          </a:p>
+          <a:p>
+            <a:r>
+              <a:rPr lang="en-US" dirty="0" smtClean="0"/>
+              <a:t>Newlines on new scopes are indented with 2 spaces</a:t>
+            </a:r>
+          </a:p>
+          <a:p>
+            <a:pPr lvl="1"/>
+            <a:r>
+              <a:rPr lang="en-US" dirty="0" smtClean="0"/>
+              <a:t>(let ()</a:t>
+            </a:r>
+            <a:br>
+              <a:rPr lang="en-US" dirty="0" smtClean="0"/>
+            </a:br>
+            <a:r>
+              <a:rPr lang="en-US" dirty="0" smtClean="0"/>
+              <a:t>  (indented-line))</a:t>
+            </a:r>
+            <a:endParaRPr lang="en-US" dirty="0"/>
+          </a:p>
+        </p:txBody>
+      </p:sp>
+    </p:spTree>
+    <p:extLst>
+      <p:ext uri="{BB962C8B-B14F-4D97-AF65-F5344CB8AC3E}">
+        <p14:creationId xmlns:p14="http://schemas.microsoft.com/office/powerpoint/2010/main" val="3473300887"/>
+      </p:ext>
+    </p:extLst>
+  </p:cSld>
+  <p:clrMapOvr>
+    <a:masterClrMapping/>
+  </p:clrMapOvr>
+  <p:timing>
+    <p:tnLst>
+      <p:par>
+        <p:cTn id="1" dur="indefinite" restart="never" nodeType="tmRoot">
+          <p:childTnLst>
+            <p:seq concurrent="1" nextAc="seek">
+              <p:cTn id="2" dur="indefinite" nodeType="mainSeq">
+                <p:childTnLst>
+                  <p:par>
+                    <p:cTn id="3" fill="hold">
+                      <p:stCondLst>
+                        <p:cond delay="indefinite"/>
+                      </p:stCondLst>
+                      <p:childTnLst>
+                        <p:par>
+                          <p:cTn id="4" fill="hold">
+                            <p:stCondLst>
+                              <p:cond delay="0"/>
+                            </p:stCondLst>
+                            <p:childTnLst>
+                              <p:par>
+                                <p:cTn id="5" presetID="1" presetClass="entr" presetSubtype="0" fill="hold" grpId="0" nodeType="clickEffect">
+                                  <p:stCondLst>
+                                    <p:cond delay="0"/>
+                                  </p:stCondLst>
+                                  <p:childTnLst>
+                                    <p:set>
+                                      <p:cBhvr>
+                                        <p:cTn id="6" dur="1" fill="hold">
+                                          <p:stCondLst>
+                                            <p:cond delay="0"/>
+                                          </p:stCondLst>
+                                        </p:cTn>
+                                        <p:tgtEl>
+                                          <p:spTgt spid="3">
+                                            <p:txEl>
+                                              <p:pRg st="0" end="0"/>
+                                            </p:txEl>
+                                          </p:spTgt>
+                                        </p:tgtEl>
+                                        <p:attrNameLst>
+                                          <p:attrName>style.visibility</p:attrName>
+                                        </p:attrNameLst>
+                                      </p:cBhvr>
+                                      <p:to>
+                                        <p:strVal val="visible"/>
+                                      </p:to>
+                                    </p:set>
+                                  </p:childTnLst>
+                                </p:cTn>
+                              </p:par>
+                            </p:childTnLst>
+                          </p:cTn>
+                        </p:par>
+                      </p:childTnLst>
+                    </p:cTn>
+                  </p:par>
+                  <p:par>
+                    <p:cTn id="7" fill="hold">
+                      <p:stCondLst>
+                        <p:cond delay="indefinite"/>
+                      </p:stCondLst>
+                      <p:childTnLst>
+                        <p:par>
+                          <p:cTn id="8" fill="hold">
+                            <p:stCondLst>
+                              <p:cond delay="0"/>
+                            </p:stCondLst>
+                            <p:childTnLst>
+                              <p:par>
+                                <p:cTn id="9" presetID="1" presetClass="entr" presetSubtype="0" fill="hold" grpId="0" nodeType="clickEffect">
+                                  <p:stCondLst>
+                                    <p:cond delay="0"/>
+                                  </p:stCondLst>
+                                  <p:childTnLst>
+                                    <p:set>
+                                      <p:cBhvr>
+                                        <p:cTn id="10" dur="1" fill="hold">
+                                          <p:stCondLst>
+                                            <p:cond delay="0"/>
+                                          </p:stCondLst>
+                                        </p:cTn>
+                                        <p:tgtEl>
+                                          <p:spTgt spid="3">
+                                            <p:txEl>
+                                              <p:pRg st="1" end="1"/>
+                                            </p:txEl>
+                                          </p:spTgt>
+                                        </p:tgtEl>
+                                        <p:attrNameLst>
+                                          <p:attrName>style.visibility</p:attrName>
+                                        </p:attrNameLst>
+                                      </p:cBhvr>
+                                      <p:to>
+                                        <p:strVal val="visible"/>
+                                      </p:to>
+                                    </p:set>
+                                  </p:childTnLst>
+                                </p:cTn>
+                              </p:par>
+                              <p:par>
+                                <p:cTn id="11" presetID="1" presetClass="entr" presetSubtype="0" fill="hold" grpId="0" nodeType="withEffect">
+                                  <p:stCondLst>
+                                    <p:cond delay="0"/>
+                                  </p:stCondLst>
+                                  <p:childTnLst>
+                                    <p:set>
+                                      <p:cBhvr>
+                                        <p:cTn id="12" dur="1" fill="hold">
+                                          <p:stCondLst>
+                                            <p:cond delay="0"/>
+                                          </p:stCondLst>
+                                        </p:cTn>
+                                        <p:tgtEl>
+                                          <p:spTgt spid="3">
+                                            <p:txEl>
+                                              <p:pRg st="2" end="2"/>
+                                            </p:txEl>
+                                          </p:spTgt>
+                                        </p:tgtEl>
+                                        <p:attrNameLst>
+                                          <p:attrName>style.visibility</p:attrName>
+                                        </p:attrNameLst>
+                                      </p:cBhvr>
+                                      <p:to>
+                                        <p:strVal val="visible"/>
+                                      </p:to>
+                                    </p:set>
+                                  </p:childTnLst>
+                                </p:cTn>
+                              </p:par>
+                            </p:childTnLst>
+                          </p:cTn>
+                        </p:par>
+                      </p:childTnLst>
+                    </p:cTn>
+                  </p:par>
+                  <p:par>
+                    <p:cTn id="13" fill="hold">
+                      <p:stCondLst>
+                        <p:cond delay="indefinite"/>
+                      </p:stCondLst>
+                      <p:childTnLst>
+                        <p:par>
+                          <p:cTn id="14" fill="hold">
+                            <p:stCondLst>
+                              <p:cond delay="0"/>
+                            </p:stCondLst>
+                            <p:childTnLst>
+                              <p:par>
+                                <p:cTn id="15" presetID="1" presetClass="entr" presetSubtype="0" fill="hold" grpId="0" nodeType="clickEffect">
+                                  <p:stCondLst>
+                                    <p:cond delay="0"/>
+                                  </p:stCondLst>
+                                  <p:childTnLst>
+                                    <p:set>
+                                      <p:cBhvr>
+                                        <p:cTn id="16" dur="1" fill="hold">
+                                          <p:stCondLst>
+                                            <p:cond delay="0"/>
+                                          </p:stCondLst>
+                                        </p:cTn>
+                                        <p:tgtEl>
+                                          <p:spTgt spid="3">
+                                            <p:txEl>
+                                              <p:pRg st="3" end="3"/>
+                                            </p:txEl>
+                                          </p:spTgt>
+                                        </p:tgtEl>
+                                        <p:attrNameLst>
+                                          <p:attrName>style.visibility</p:attrName>
+                                        </p:attrNameLst>
+                                      </p:cBhvr>
+                                      <p:to>
+                                        <p:strVal val="visible"/>
+                                      </p:to>
+                                    </p:set>
+                                  </p:childTnLst>
+                                </p:cTn>
+                              </p:par>
+                              <p:par>
+                                <p:cTn id="17" presetID="1" presetClass="entr" presetSubtype="0" fill="hold" grpId="0" nodeType="withEffect">
+                                  <p:stCondLst>
+                                    <p:cond delay="0"/>
+                                  </p:stCondLst>
+                                  <p:childTnLst>
+                                    <p:set>
+                                      <p:cBhvr>
+                                        <p:cTn id="18" dur="1" fill="hold">
+                                          <p:stCondLst>
+                                            <p:cond delay="0"/>
+                                          </p:stCondLst>
+                                        </p:cTn>
+                                        <p:tgtEl>
+                                          <p:spTgt spid="3">
+                                            <p:txEl>
+                                              <p:pRg st="4" end="4"/>
+                                            </p:txEl>
+                                          </p:spTgt>
+                                        </p:tgtEl>
+                                        <p:attrNameLst>
+                                          <p:attrName>style.visibility</p:attrName>
+                                        </p:attrNameLst>
+                                      </p:cBhvr>
+                                      <p:to>
+                                        <p:strVal val="visible"/>
+                                      </p:to>
+                                    </p:set>
+                                  </p:childTnLst>
+                                </p:cTn>
+                              </p:par>
+                            </p:childTnLst>
+                          </p:cTn>
+                        </p:par>
+                      </p:childTnLst>
+                    </p:cTn>
+                  </p:par>
+                </p:childTnLst>
+              </p:cTn>
+              <p:prevCondLst>
+                <p:cond evt="onPrev" delay="0">
+                  <p:tgtEl>
+                    <p:sldTgt/>
+                  </p:tgtEl>
+                </p:cond>
+              </p:prevCondLst>
+              <p:nextCondLst>
+                <p:cond evt="onNext" delay="0">
+                  <p:tgtEl>
+                    <p:sldTgt/>
+                  </p:tgtEl>
+                </p:cond>
+              </p:nextCondLst>
+            </p:seq>
+          </p:childTnLst>
+        </p:cTn>
+      </p:par>
+    </p:tnLst>
+    <p:bldLst>
+      <p:bldP spid="3" grpId="0" build="p"/>
+    </p:bldLst>
+  </p:timing>
+</p:sld>
+</file>
+
+<file path=ppt/slides/slide13.xml><?xml version="1.0" encoding="utf-8"?>
+<p:sld xmlns:a="http://schemas.openxmlformats.org/drawingml/2006/main" xmlns:r="http://schemas.openxmlformats.org/officeDocument/2006/relationships" xmlns:p="http://schemas.openxmlformats.org/presentationml/2006/main">
+  <p:cSld>
+    <p:spTree>
+      <p:nvGrpSpPr>
+        <p:cNvPr id="1" name=""/>
+        <p:cNvGrpSpPr/>
+        <p:nvPr/>
+      </p:nvGrpSpPr>
+      <p:grpSpPr>
+        <a:xfrm>
+          <a:off x="0" y="0"/>
+          <a:ext cx="0" cy="0"/>
+          <a:chOff x="0" y="0"/>
+          <a:chExt cx="0" cy="0"/>
+        </a:xfrm>
+      </p:grpSpPr>
+      <p:sp>
+        <p:nvSpPr>
+          <p:cNvPr id="2" name="Title 1"/>
+          <p:cNvSpPr>
+            <a:spLocks noGrp="1"/>
+          </p:cNvSpPr>
+          <p:nvPr>
+            <p:ph type="title"/>
+          </p:nvPr>
+        </p:nvSpPr>
+        <p:spPr/>
+        <p:txBody>
+          <a:bodyPr/>
+          <a:lstStyle/>
+          <a:p>
+            <a:r>
+              <a:rPr lang="en-US" dirty="0" smtClean="0"/>
+              <a:t>Putting it together</a:t>
+            </a:r>
+            <a:endParaRPr lang="en-US" dirty="0"/>
+          </a:p>
+        </p:txBody>
+      </p:sp>
+      <p:sp>
+        <p:nvSpPr>
+          <p:cNvPr id="3" name="Content Placeholder 2"/>
+          <p:cNvSpPr>
+            <a:spLocks noGrp="1"/>
+          </p:cNvSpPr>
+          <p:nvPr>
+            <p:ph idx="1"/>
+          </p:nvPr>
+        </p:nvSpPr>
+        <p:spPr/>
+        <p:txBody>
+          <a:bodyPr/>
+          <a:lstStyle/>
+          <a:p>
+            <a:r>
+              <a:rPr lang="en-US" dirty="0" smtClean="0"/>
+              <a:t>An </a:t>
+            </a:r>
+            <a:r>
+              <a:rPr lang="en-US" dirty="0" smtClean="0"/>
+              <a:t>example:</a:t>
             </a:r>
           </a:p>
           <a:p>
@@ -13715,7 +14086,7 @@
 </p:sld>
 </file>
 
-<file path=ppt/slides/slide13.xml><?xml version="1.0" encoding="utf-8"?>
+<file path=ppt/slides/slide14.xml><?xml version="1.0" encoding="utf-8"?>
 <p:sld xmlns:a="http://schemas.openxmlformats.org/drawingml/2006/main" xmlns:r="http://schemas.openxmlformats.org/officeDocument/2006/relationships" xmlns:p="http://schemas.openxmlformats.org/presentationml/2006/main">
   <p:cSld>
     <p:spTree>
@@ -13775,7 +14146,7 @@
 </p:sld>
 </file>
 
-<file path=ppt/slides/slide14.xml><?xml version="1.0" encoding="utf-8"?>
+<file path=ppt/slides/slide15.xml><?xml version="1.0" encoding="utf-8"?>
 <p:sld xmlns:a="http://schemas.openxmlformats.org/drawingml/2006/main" xmlns:r="http://schemas.openxmlformats.org/officeDocument/2006/relationships" xmlns:p="http://schemas.openxmlformats.org/presentationml/2006/main">
   <p:cSld>
     <p:spTree>
@@ -14147,7 +14518,7 @@
 </p:sld>
 </file>
 
-<file path=ppt/slides/slide15.xml><?xml version="1.0" encoding="utf-8"?>
+<file path=ppt/slides/slide16.xml><?xml version="1.0" encoding="utf-8"?>
 <p:sld xmlns:a="http://schemas.openxmlformats.org/drawingml/2006/main" xmlns:r="http://schemas.openxmlformats.org/officeDocument/2006/relationships" xmlns:p="http://schemas.openxmlformats.org/presentationml/2006/main">
   <p:cSld>
     <p:spTree>
@@ -14271,7 +14642,7 @@
 </p:sld>
 </file>
 
-<file path=ppt/slides/slide16.xml><?xml version="1.0" encoding="utf-8"?>
+<file path=ppt/slides/slide17.xml><?xml version="1.0" encoding="utf-8"?>
 <p:sld xmlns:a="http://schemas.openxmlformats.org/drawingml/2006/main" xmlns:r="http://schemas.openxmlformats.org/officeDocument/2006/relationships" xmlns:p="http://schemas.openxmlformats.org/presentationml/2006/main">
   <p:cSld>
     <p:spTree>
@@ -14332,7 +14703,7 @@
 </p:sld>
 </file>
 
-<file path=ppt/slides/slide17.xml><?xml version="1.0" encoding="utf-8"?>
+<file path=ppt/slides/slide18.xml><?xml version="1.0" encoding="utf-8"?>
 <p:sld xmlns:a="http://schemas.openxmlformats.org/drawingml/2006/main" xmlns:r="http://schemas.openxmlformats.org/officeDocument/2006/relationships" xmlns:p="http://schemas.openxmlformats.org/presentationml/2006/main">
   <p:cSld>
     <p:spTree>
@@ -14737,7 +15108,7 @@
 </p:sld>
 </file>
 
-<file path=ppt/slides/slide18.xml><?xml version="1.0" encoding="utf-8"?>
+<file path=ppt/slides/slide19.xml><?xml version="1.0" encoding="utf-8"?>
 <p:sld xmlns:a="http://schemas.openxmlformats.org/drawingml/2006/main" xmlns:r="http://schemas.openxmlformats.org/officeDocument/2006/relationships" xmlns:p="http://schemas.openxmlformats.org/presentationml/2006/main">
   <p:cSld>
     <p:spTree>
@@ -14798,7 +15169,115 @@
 </p:sld>
 </file>
 
-<file path=ppt/slides/slide19.xml><?xml version="1.0" encoding="utf-8"?>
+<file path=ppt/slides/slide2.xml><?xml version="1.0" encoding="utf-8"?>
+<p:sld xmlns:a="http://schemas.openxmlformats.org/drawingml/2006/main" xmlns:r="http://schemas.openxmlformats.org/officeDocument/2006/relationships" xmlns:p="http://schemas.openxmlformats.org/presentationml/2006/main">
+  <p:cSld>
+    <p:spTree>
+      <p:nvGrpSpPr>
+        <p:cNvPr id="1" name=""/>
+        <p:cNvGrpSpPr/>
+        <p:nvPr/>
+      </p:nvGrpSpPr>
+      <p:grpSpPr>
+        <a:xfrm>
+          <a:off x="0" y="0"/>
+          <a:ext cx="0" cy="0"/>
+          <a:chOff x="0" y="0"/>
+          <a:chExt cx="0" cy="0"/>
+        </a:xfrm>
+      </p:grpSpPr>
+      <p:sp>
+        <p:nvSpPr>
+          <p:cNvPr id="2" name="Title 1"/>
+          <p:cNvSpPr>
+            <a:spLocks noGrp="1"/>
+          </p:cNvSpPr>
+          <p:nvPr>
+            <p:ph type="title"/>
+          </p:nvPr>
+        </p:nvSpPr>
+        <p:spPr/>
+        <p:txBody>
+          <a:bodyPr/>
+          <a:lstStyle/>
+          <a:p>
+            <a:r>
+              <a:rPr lang="en-US" dirty="0" smtClean="0"/>
+              <a:t>Object Oriented Code has problems</a:t>
+            </a:r>
+            <a:endParaRPr lang="en-US" dirty="0"/>
+          </a:p>
+        </p:txBody>
+      </p:sp>
+      <p:sp>
+        <p:nvSpPr>
+          <p:cNvPr id="3" name="Content Placeholder 2"/>
+          <p:cNvSpPr>
+            <a:spLocks noGrp="1"/>
+          </p:cNvSpPr>
+          <p:nvPr>
+            <p:ph idx="1"/>
+          </p:nvPr>
+        </p:nvSpPr>
+        <p:spPr/>
+        <p:txBody>
+          <a:bodyPr/>
+          <a:lstStyle/>
+          <a:p>
+            <a:r>
+              <a:rPr lang="en-US" dirty="0"/>
+              <a:t>“With OOP-inflected programming languages, computer software becomes more verbose, less readable, less descriptive, and harder to modify and maintain</a:t>
+            </a:r>
+            <a:r>
+              <a:rPr lang="en-US" dirty="0" smtClean="0"/>
+              <a:t>.” – Richard </a:t>
+            </a:r>
+            <a:r>
+              <a:rPr lang="en-US" dirty="0" smtClean="0"/>
+              <a:t>Mansfield</a:t>
+            </a:r>
+          </a:p>
+          <a:p>
+            <a:endParaRPr lang="en-US" dirty="0" smtClean="0"/>
+          </a:p>
+          <a:p>
+            <a:r>
+              <a:rPr lang="en-US" dirty="0"/>
+              <a:t>“OOP is about taming complexity through modeling, but we have not mastered this yet, possibly because we have difficulty distinguishing real and accidental complexity</a:t>
+            </a:r>
+            <a:r>
+              <a:rPr lang="en-US" dirty="0" smtClean="0"/>
+              <a:t>.” – Oscar </a:t>
+            </a:r>
+            <a:r>
+              <a:rPr lang="en-US" dirty="0" err="1" smtClean="0"/>
+              <a:t>Nierstraz</a:t>
+            </a:r>
+            <a:endParaRPr lang="en-US" dirty="0"/>
+          </a:p>
+        </p:txBody>
+      </p:sp>
+    </p:spTree>
+    <p:extLst>
+      <p:ext uri="{BB962C8B-B14F-4D97-AF65-F5344CB8AC3E}">
+        <p14:creationId xmlns:p14="http://schemas.microsoft.com/office/powerpoint/2010/main" val="3286954311"/>
+      </p:ext>
+    </p:extLst>
+  </p:cSld>
+  <p:clrMapOvr>
+    <a:masterClrMapping/>
+  </p:clrMapOvr>
+  <p:timing>
+    <p:tnLst>
+      <p:par>
+        <p:cTn id="1" dur="indefinite" restart="never" nodeType="tmRoot"/>
+      </p:par>
+    </p:tnLst>
+  </p:timing>
+</p:sld>
+</file>
+
+<file path=ppt/slides/slide20.xml><?xml version="1.0" encoding="utf-8"?>
 <p:sld xmlns:a="http://schemas.openxmlformats.org/drawingml/2006/main" xmlns:r="http://schemas.openxmlformats.org/officeDocument/2006/relationships" xmlns:p="http://schemas.openxmlformats.org/presentationml/2006/main">
   <p:cSld>
     <p:spTree>
@@ -14859,115 +15338,7 @@
 </p:sld>
 </file>
 
-<file path=ppt/slides/slide2.xml><?xml version="1.0" encoding="utf-8"?>
-<p:sld xmlns:a="http://schemas.openxmlformats.org/drawingml/2006/main" xmlns:r="http://schemas.openxmlformats.org/officeDocument/2006/relationships" xmlns:p="http://schemas.openxmlformats.org/presentationml/2006/main">
-  <p:cSld>
-    <p:spTree>
-      <p:nvGrpSpPr>
-        <p:cNvPr id="1" name=""/>
-        <p:cNvGrpSpPr/>
-        <p:nvPr/>
-      </p:nvGrpSpPr>
-      <p:grpSpPr>
-        <a:xfrm>
-          <a:off x="0" y="0"/>
-          <a:ext cx="0" cy="0"/>
-          <a:chOff x="0" y="0"/>
-          <a:chExt cx="0" cy="0"/>
-        </a:xfrm>
-      </p:grpSpPr>
-      <p:sp>
-        <p:nvSpPr>
-          <p:cNvPr id="2" name="Title 1"/>
-          <p:cNvSpPr>
-            <a:spLocks noGrp="1"/>
-          </p:cNvSpPr>
-          <p:nvPr>
-            <p:ph type="title"/>
-          </p:nvPr>
-        </p:nvSpPr>
-        <p:spPr/>
-        <p:txBody>
-          <a:bodyPr/>
-          <a:lstStyle/>
-          <a:p>
-            <a:r>
-              <a:rPr lang="en-US" dirty="0" smtClean="0"/>
-              <a:t>Object Oriented Code has problems</a:t>
-            </a:r>
-            <a:endParaRPr lang="en-US" dirty="0"/>
-          </a:p>
-        </p:txBody>
-      </p:sp>
-      <p:sp>
-        <p:nvSpPr>
-          <p:cNvPr id="3" name="Content Placeholder 2"/>
-          <p:cNvSpPr>
-            <a:spLocks noGrp="1"/>
-          </p:cNvSpPr>
-          <p:nvPr>
-            <p:ph idx="1"/>
-          </p:nvPr>
-        </p:nvSpPr>
-        <p:spPr/>
-        <p:txBody>
-          <a:bodyPr/>
-          <a:lstStyle/>
-          <a:p>
-            <a:r>
-              <a:rPr lang="en-US" dirty="0"/>
-              <a:t>“With OOP-inflected programming languages, computer software becomes more verbose, less readable, less descriptive, and harder to modify and maintain</a:t>
-            </a:r>
-            <a:r>
-              <a:rPr lang="en-US" dirty="0" smtClean="0"/>
-              <a:t>.” – Richard </a:t>
-            </a:r>
-            <a:r>
-              <a:rPr lang="en-US" dirty="0" smtClean="0"/>
-              <a:t>Mansfield</a:t>
-            </a:r>
-          </a:p>
-          <a:p>
-            <a:endParaRPr lang="en-US" dirty="0" smtClean="0"/>
-          </a:p>
-          <a:p>
-            <a:r>
-              <a:rPr lang="en-US" dirty="0"/>
-              <a:t>“OOP is about taming complexity through modeling, but we have not mastered this yet, possibly because we have difficulty distinguishing real and accidental complexity</a:t>
-            </a:r>
-            <a:r>
-              <a:rPr lang="en-US" dirty="0" smtClean="0"/>
-              <a:t>.” – Oscar </a:t>
-            </a:r>
-            <a:r>
-              <a:rPr lang="en-US" dirty="0" err="1" smtClean="0"/>
-              <a:t>Nierstraz</a:t>
-            </a:r>
-            <a:endParaRPr lang="en-US" dirty="0"/>
-          </a:p>
-        </p:txBody>
-      </p:sp>
-    </p:spTree>
-    <p:extLst>
-      <p:ext uri="{BB962C8B-B14F-4D97-AF65-F5344CB8AC3E}">
-        <p14:creationId xmlns:p14="http://schemas.microsoft.com/office/powerpoint/2010/main" val="3286954311"/>
-      </p:ext>
-    </p:extLst>
-  </p:cSld>
-  <p:clrMapOvr>
-    <a:masterClrMapping/>
-  </p:clrMapOvr>
-  <p:timing>
-    <p:tnLst>
-      <p:par>
-        <p:cTn id="1" dur="indefinite" restart="never" nodeType="tmRoot"/>
-      </p:par>
-    </p:tnLst>
-  </p:timing>
-</p:sld>
-</file>
-
-<file path=ppt/slides/slide20.xml><?xml version="1.0" encoding="utf-8"?>
+<file path=ppt/slides/slide21.xml><?xml version="1.0" encoding="utf-8"?>
 <p:sld xmlns:a="http://schemas.openxmlformats.org/drawingml/2006/main" xmlns:r="http://schemas.openxmlformats.org/officeDocument/2006/relationships" xmlns:p="http://schemas.openxmlformats.org/presentationml/2006/main">
   <p:cSld>
     <p:spTree>
@@ -15028,7 +15399,7 @@
 </p:sld>
 </file>
 
-<file path=ppt/slides/slide21.xml><?xml version="1.0" encoding="utf-8"?>
+<file path=ppt/slides/slide22.xml><?xml version="1.0" encoding="utf-8"?>
 <p:sld xmlns:a="http://schemas.openxmlformats.org/drawingml/2006/main" xmlns:r="http://schemas.openxmlformats.org/officeDocument/2006/relationships" xmlns:p="http://schemas.openxmlformats.org/presentationml/2006/main">
   <p:cSld>
     <p:spTree>
@@ -15426,7 +15797,7 @@
 </p:sld>
 </file>
 
-<file path=ppt/slides/slide22.xml><?xml version="1.0" encoding="utf-8"?>
+<file path=ppt/slides/slide23.xml><?xml version="1.0" encoding="utf-8"?>
 <p:sld xmlns:a="http://schemas.openxmlformats.org/drawingml/2006/main" xmlns:r="http://schemas.openxmlformats.org/officeDocument/2006/relationships" xmlns:p="http://schemas.openxmlformats.org/presentationml/2006/main">
   <p:cSld>
     <p:spTree>
@@ -15487,74 +15858,6 @@
 </p:sld>
 </file>
 
-<file path=ppt/slides/slide23.xml><?xml version="1.0" encoding="utf-8"?>
-<p:sld xmlns:a="http://schemas.openxmlformats.org/drawingml/2006/main" xmlns:r="http://schemas.openxmlformats.org/officeDocument/2006/relationships" xmlns:p="http://schemas.openxmlformats.org/presentationml/2006/main">
-  <p:cSld>
-    <p:spTree>
-      <p:nvGrpSpPr>
-        <p:cNvPr id="1" name=""/>
-        <p:cNvGrpSpPr/>
-        <p:nvPr/>
-      </p:nvGrpSpPr>
-      <p:grpSpPr>
-        <a:xfrm>
-          <a:off x="0" y="0"/>
-          <a:ext cx="0" cy="0"/>
-          <a:chOff x="0" y="0"/>
-          <a:chExt cx="0" cy="0"/>
-        </a:xfrm>
-      </p:grpSpPr>
-      <p:sp>
-        <p:nvSpPr>
-          <p:cNvPr id="2" name="Title 1"/>
-          <p:cNvSpPr>
-            <a:spLocks noGrp="1"/>
-          </p:cNvSpPr>
-          <p:nvPr>
-            <p:ph type="title"/>
-          </p:nvPr>
-        </p:nvSpPr>
-        <p:spPr/>
-        <p:txBody>
-          <a:bodyPr/>
-          <a:lstStyle/>
-          <a:p>
-            <a:r>
-              <a:rPr lang="en-US" dirty="0" smtClean="0"/>
-              <a:t>Before code examples - </a:t>
-            </a:r>
-            <a:r>
-              <a:rPr lang="en-US" dirty="0" smtClean="0"/>
-              <a:t>Questions </a:t>
-            </a:r>
-            <a:r>
-              <a:rPr lang="en-US" dirty="0" smtClean="0"/>
-              <a:t>on dfc3?</a:t>
-            </a:r>
-            <a:endParaRPr lang="en-US" dirty="0"/>
-          </a:p>
-        </p:txBody>
-      </p:sp>
-    </p:spTree>
-    <p:extLst>
-      <p:ext uri="{BB962C8B-B14F-4D97-AF65-F5344CB8AC3E}">
-        <p14:creationId xmlns:p14="http://schemas.microsoft.com/office/powerpoint/2010/main" val="573360119"/>
-      </p:ext>
-    </p:extLst>
-  </p:cSld>
-  <p:clrMapOvr>
-    <a:masterClrMapping/>
-  </p:clrMapOvr>
-  <p:timing>
-    <p:tnLst>
-      <p:par>
-        <p:cTn id="1" dur="indefinite" restart="never" nodeType="tmRoot"/>
-      </p:par>
-    </p:tnLst>
-  </p:timing>
-</p:sld>
-</file>
-
 <file path=ppt/slides/slide24.xml><?xml version="1.0" encoding="utf-8"?>
 <p:sld xmlns:a="http://schemas.openxmlformats.org/drawingml/2006/main" xmlns:r="http://schemas.openxmlformats.org/officeDocument/2006/relationships" xmlns:p="http://schemas.openxmlformats.org/presentationml/2006/main">
   <p:cSld>
@@ -15589,6 +15892,74 @@
           <a:p>
             <a:r>
               <a:rPr lang="en-US" dirty="0" smtClean="0"/>
+              <a:t>Before code examples - </a:t>
+            </a:r>
+            <a:r>
+              <a:rPr lang="en-US" dirty="0" smtClean="0"/>
+              <a:t>Questions </a:t>
+            </a:r>
+            <a:r>
+              <a:rPr lang="en-US" dirty="0" smtClean="0"/>
+              <a:t>on dfc3?</a:t>
+            </a:r>
+            <a:endParaRPr lang="en-US" dirty="0"/>
+          </a:p>
+        </p:txBody>
+      </p:sp>
+    </p:spTree>
+    <p:extLst>
+      <p:ext uri="{BB962C8B-B14F-4D97-AF65-F5344CB8AC3E}">
+        <p14:creationId xmlns:p14="http://schemas.microsoft.com/office/powerpoint/2010/main" val="573360119"/>
+      </p:ext>
+    </p:extLst>
+  </p:cSld>
+  <p:clrMapOvr>
+    <a:masterClrMapping/>
+  </p:clrMapOvr>
+  <p:timing>
+    <p:tnLst>
+      <p:par>
+        <p:cTn id="1" dur="indefinite" restart="never" nodeType="tmRoot"/>
+      </p:par>
+    </p:tnLst>
+  </p:timing>
+</p:sld>
+</file>
+
+<file path=ppt/slides/slide25.xml><?xml version="1.0" encoding="utf-8"?>
+<p:sld xmlns:a="http://schemas.openxmlformats.org/drawingml/2006/main" xmlns:r="http://schemas.openxmlformats.org/officeDocument/2006/relationships" xmlns:p="http://schemas.openxmlformats.org/presentationml/2006/main">
+  <p:cSld>
+    <p:spTree>
+      <p:nvGrpSpPr>
+        <p:cNvPr id="1" name=""/>
+        <p:cNvGrpSpPr/>
+        <p:nvPr/>
+      </p:nvGrpSpPr>
+      <p:grpSpPr>
+        <a:xfrm>
+          <a:off x="0" y="0"/>
+          <a:ext cx="0" cy="0"/>
+          <a:chOff x="0" y="0"/>
+          <a:chExt cx="0" cy="0"/>
+        </a:xfrm>
+      </p:grpSpPr>
+      <p:sp>
+        <p:nvSpPr>
+          <p:cNvPr id="2" name="Title 1"/>
+          <p:cNvSpPr>
+            <a:spLocks noGrp="1"/>
+          </p:cNvSpPr>
+          <p:nvPr>
+            <p:ph type="title"/>
+          </p:nvPr>
+        </p:nvSpPr>
+        <p:spPr/>
+        <p:txBody>
+          <a:bodyPr/>
+          <a:lstStyle/>
+          <a:p>
+            <a:r>
+              <a:rPr lang="en-US" dirty="0" smtClean="0"/>
               <a:t>DFC3 Code Examples</a:t>
             </a:r>
             <a:endParaRPr lang="en-US" dirty="0"/>
@@ -15643,7 +16014,7 @@
 </p:sld>
 </file>
 
-<file path=ppt/slides/slide25.xml><?xml version="1.0" encoding="utf-8"?>
+<file path=ppt/slides/slide26.xml><?xml version="1.0" encoding="utf-8"?>
 <p:sld xmlns:a="http://schemas.openxmlformats.org/drawingml/2006/main" xmlns:r="http://schemas.openxmlformats.org/officeDocument/2006/relationships" xmlns:p="http://schemas.openxmlformats.org/presentationml/2006/main">
   <p:cSld>
     <p:spTree>
@@ -16790,7 +17161,7 @@
 </p:sld>
 </file>
 
-<file path=ppt/slides/slide26.xml><?xml version="1.0" encoding="utf-8"?>
+<file path=ppt/slides/slide27.xml><?xml version="1.0" encoding="utf-8"?>
 <p:sld xmlns:a="http://schemas.openxmlformats.org/drawingml/2006/main" xmlns:r="http://schemas.openxmlformats.org/officeDocument/2006/relationships" xmlns:p="http://schemas.openxmlformats.org/presentationml/2006/main">
   <p:cSld>
     <p:spTree>
@@ -17910,7 +18281,7 @@
 </p:sld>
 </file>
 
-<file path=ppt/slides/slide27.xml><?xml version="1.0" encoding="utf-8"?>
+<file path=ppt/slides/slide28.xml><?xml version="1.0" encoding="utf-8"?>
 <p:sld xmlns:a="http://schemas.openxmlformats.org/drawingml/2006/main" xmlns:r="http://schemas.openxmlformats.org/officeDocument/2006/relationships" xmlns:p="http://schemas.openxmlformats.org/presentationml/2006/main">
   <p:cSld>
     <p:spTree>
@@ -19573,7 +19944,7 @@
 </p:sld>
 </file>
 
-<file path=ppt/slides/slide28.xml><?xml version="1.0" encoding="utf-8"?>
+<file path=ppt/slides/slide29.xml><?xml version="1.0" encoding="utf-8"?>
 <p:sld xmlns:a="http://schemas.openxmlformats.org/drawingml/2006/main" xmlns:r="http://schemas.openxmlformats.org/officeDocument/2006/relationships" xmlns:p="http://schemas.openxmlformats.org/presentationml/2006/main">
   <p:cSld>
     <p:spTree>
@@ -21373,7 +21744,429 @@
 </p:sld>
 </file>
 
-<file path=ppt/slides/slide29.xml><?xml version="1.0" encoding="utf-8"?>
+<file path=ppt/slides/slide3.xml><?xml version="1.0" encoding="utf-8"?>
+<p:sld xmlns:a="http://schemas.openxmlformats.org/drawingml/2006/main" xmlns:r="http://schemas.openxmlformats.org/officeDocument/2006/relationships" xmlns:p="http://schemas.openxmlformats.org/presentationml/2006/main">
+  <p:cSld>
+    <p:spTree>
+      <p:nvGrpSpPr>
+        <p:cNvPr id="1" name=""/>
+        <p:cNvGrpSpPr/>
+        <p:nvPr/>
+      </p:nvGrpSpPr>
+      <p:grpSpPr>
+        <a:xfrm>
+          <a:off x="0" y="0"/>
+          <a:ext cx="0" cy="0"/>
+          <a:chOff x="0" y="0"/>
+          <a:chExt cx="0" cy="0"/>
+        </a:xfrm>
+      </p:grpSpPr>
+      <p:sp>
+        <p:nvSpPr>
+          <p:cNvPr id="2" name="Title 1"/>
+          <p:cNvSpPr>
+            <a:spLocks noGrp="1"/>
+          </p:cNvSpPr>
+          <p:nvPr>
+            <p:ph type="title"/>
+          </p:nvPr>
+        </p:nvSpPr>
+        <p:spPr/>
+        <p:txBody>
+          <a:bodyPr/>
+          <a:lstStyle/>
+          <a:p>
+            <a:r>
+              <a:rPr lang="en-US" dirty="0" smtClean="0"/>
+              <a:t>Keeping State data and Functions Separate</a:t>
+            </a:r>
+            <a:endParaRPr lang="en-US" dirty="0"/>
+          </a:p>
+        </p:txBody>
+      </p:sp>
+      <p:sp>
+        <p:nvSpPr>
+          <p:cNvPr id="3" name="Content Placeholder 2"/>
+          <p:cNvSpPr>
+            <a:spLocks noGrp="1"/>
+          </p:cNvSpPr>
+          <p:nvPr>
+            <p:ph idx="1"/>
+          </p:nvPr>
+        </p:nvSpPr>
+        <p:spPr>
+          <a:xfrm>
+            <a:off x="1141412" y="2249487"/>
+            <a:ext cx="10260013" cy="4237038"/>
+          </a:xfrm>
+        </p:spPr>
+        <p:txBody>
+          <a:bodyPr>
+            <a:normAutofit/>
+          </a:bodyPr>
+          <a:lstStyle/>
+          <a:p>
+            <a:r>
+              <a:rPr lang="en-US" dirty="0" smtClean="0"/>
+              <a:t>Current </a:t>
+            </a:r>
+            <a:r>
+              <a:rPr lang="en-US" dirty="0" smtClean="0"/>
+              <a:t>best practice Object Oriented </a:t>
+            </a:r>
+            <a:r>
+              <a:rPr lang="en-US" dirty="0" smtClean="0"/>
+              <a:t>Programming </a:t>
+            </a:r>
+            <a:r>
+              <a:rPr lang="en-US" dirty="0" smtClean="0"/>
+              <a:t>design </a:t>
+            </a:r>
+            <a:r>
+              <a:rPr lang="en-US" dirty="0" smtClean="0"/>
+              <a:t>mixes program state and program functionality by default</a:t>
+            </a:r>
+          </a:p>
+          <a:p>
+            <a:r>
+              <a:rPr lang="en-US" dirty="0" smtClean="0"/>
+              <a:t>Mixing program state with </a:t>
+            </a:r>
+            <a:r>
+              <a:rPr lang="en-US" dirty="0" smtClean="0"/>
+              <a:t>functions:</a:t>
+            </a:r>
+          </a:p>
+          <a:p>
+            <a:pPr lvl="1"/>
+            <a:r>
+              <a:rPr lang="en-US" dirty="0" smtClean="0"/>
+              <a:t>makes testing difficult because program state must be simulated</a:t>
+            </a:r>
+          </a:p>
+          <a:p>
+            <a:pPr lvl="1"/>
+            <a:r>
+              <a:rPr lang="en-US" dirty="0" smtClean="0"/>
+              <a:t>creates </a:t>
+            </a:r>
+            <a:r>
+              <a:rPr lang="en-US" dirty="0" smtClean="0"/>
+              <a:t>unpredictable errors at unexpected </a:t>
+            </a:r>
+            <a:r>
+              <a:rPr lang="en-US" dirty="0" smtClean="0"/>
+              <a:t>times</a:t>
+            </a:r>
+          </a:p>
+          <a:p>
+            <a:pPr lvl="1"/>
+            <a:r>
+              <a:rPr lang="en-US" dirty="0" smtClean="0"/>
+              <a:t>changes in one part of your program can unexpectedly break other parts</a:t>
+            </a:r>
+            <a:endParaRPr lang="en-US" dirty="0"/>
+          </a:p>
+          <a:p>
+            <a:r>
+              <a:rPr lang="en-US" dirty="0" smtClean="0"/>
+              <a:t>If the only information </a:t>
+            </a:r>
+            <a:r>
+              <a:rPr lang="en-US" dirty="0" smtClean="0"/>
+              <a:t>functions can access is the API, these issues are mitigated</a:t>
+            </a:r>
+            <a:endParaRPr lang="en-US" dirty="0" smtClean="0"/>
+          </a:p>
+        </p:txBody>
+      </p:sp>
+    </p:spTree>
+    <p:extLst>
+      <p:ext uri="{BB962C8B-B14F-4D97-AF65-F5344CB8AC3E}">
+        <p14:creationId xmlns:p14="http://schemas.microsoft.com/office/powerpoint/2010/main" val="2594013615"/>
+      </p:ext>
+    </p:extLst>
+  </p:cSld>
+  <p:clrMapOvr>
+    <a:masterClrMapping/>
+  </p:clrMapOvr>
+  <p:timing>
+    <p:tnLst>
+      <p:par>
+        <p:cTn id="1" dur="indefinite" restart="never" nodeType="tmRoot">
+          <p:childTnLst>
+            <p:seq concurrent="1" nextAc="seek">
+              <p:cTn id="2" dur="indefinite" nodeType="mainSeq">
+                <p:childTnLst>
+                  <p:par>
+                    <p:cTn id="3" fill="hold">
+                      <p:stCondLst>
+                        <p:cond delay="indefinite"/>
+                      </p:stCondLst>
+                      <p:childTnLst>
+                        <p:par>
+                          <p:cTn id="4" fill="hold">
+                            <p:stCondLst>
+                              <p:cond delay="0"/>
+                            </p:stCondLst>
+                            <p:childTnLst>
+                              <p:par>
+                                <p:cTn id="5" presetID="1" presetClass="entr" presetSubtype="0" fill="hold" grpId="0" nodeType="clickEffect">
+                                  <p:stCondLst>
+                                    <p:cond delay="0"/>
+                                  </p:stCondLst>
+                                  <p:childTnLst>
+                                    <p:set>
+                                      <p:cBhvr>
+                                        <p:cTn id="6" dur="1" fill="hold">
+                                          <p:stCondLst>
+                                            <p:cond delay="0"/>
+                                          </p:stCondLst>
+                                        </p:cTn>
+                                        <p:tgtEl>
+                                          <p:spTgt spid="3">
+                                            <p:txEl>
+                                              <p:pRg st="0" end="0"/>
+                                            </p:txEl>
+                                          </p:spTgt>
+                                        </p:tgtEl>
+                                        <p:attrNameLst>
+                                          <p:attrName>style.visibility</p:attrName>
+                                        </p:attrNameLst>
+                                      </p:cBhvr>
+                                      <p:to>
+                                        <p:strVal val="visible"/>
+                                      </p:to>
+                                    </p:set>
+                                  </p:childTnLst>
+                                </p:cTn>
+                              </p:par>
+                            </p:childTnLst>
+                          </p:cTn>
+                        </p:par>
+                      </p:childTnLst>
+                    </p:cTn>
+                  </p:par>
+                  <p:par>
+                    <p:cTn id="7" fill="hold">
+                      <p:stCondLst>
+                        <p:cond delay="indefinite"/>
+                      </p:stCondLst>
+                      <p:childTnLst>
+                        <p:par>
+                          <p:cTn id="8" fill="hold">
+                            <p:stCondLst>
+                              <p:cond delay="0"/>
+                            </p:stCondLst>
+                            <p:childTnLst>
+                              <p:par>
+                                <p:cTn id="9" presetID="1" presetClass="entr" presetSubtype="0" fill="hold" grpId="0" nodeType="clickEffect">
+                                  <p:stCondLst>
+                                    <p:cond delay="0"/>
+                                  </p:stCondLst>
+                                  <p:childTnLst>
+                                    <p:set>
+                                      <p:cBhvr>
+                                        <p:cTn id="10" dur="1" fill="hold">
+                                          <p:stCondLst>
+                                            <p:cond delay="0"/>
+                                          </p:stCondLst>
+                                        </p:cTn>
+                                        <p:tgtEl>
+                                          <p:spTgt spid="3">
+                                            <p:txEl>
+                                              <p:pRg st="1" end="1"/>
+                                            </p:txEl>
+                                          </p:spTgt>
+                                        </p:tgtEl>
+                                        <p:attrNameLst>
+                                          <p:attrName>style.visibility</p:attrName>
+                                        </p:attrNameLst>
+                                      </p:cBhvr>
+                                      <p:to>
+                                        <p:strVal val="visible"/>
+                                      </p:to>
+                                    </p:set>
+                                  </p:childTnLst>
+                                </p:cTn>
+                              </p:par>
+                              <p:par>
+                                <p:cTn id="11" presetID="1" presetClass="entr" presetSubtype="0" fill="hold" grpId="0" nodeType="withEffect">
+                                  <p:stCondLst>
+                                    <p:cond delay="0"/>
+                                  </p:stCondLst>
+                                  <p:childTnLst>
+                                    <p:set>
+                                      <p:cBhvr>
+                                        <p:cTn id="12" dur="1" fill="hold">
+                                          <p:stCondLst>
+                                            <p:cond delay="0"/>
+                                          </p:stCondLst>
+                                        </p:cTn>
+                                        <p:tgtEl>
+                                          <p:spTgt spid="3">
+                                            <p:txEl>
+                                              <p:pRg st="2" end="2"/>
+                                            </p:txEl>
+                                          </p:spTgt>
+                                        </p:tgtEl>
+                                        <p:attrNameLst>
+                                          <p:attrName>style.visibility</p:attrName>
+                                        </p:attrNameLst>
+                                      </p:cBhvr>
+                                      <p:to>
+                                        <p:strVal val="visible"/>
+                                      </p:to>
+                                    </p:set>
+                                  </p:childTnLst>
+                                </p:cTn>
+                              </p:par>
+                              <p:par>
+                                <p:cTn id="13" presetID="1" presetClass="entr" presetSubtype="0" fill="hold" grpId="0" nodeType="withEffect">
+                                  <p:stCondLst>
+                                    <p:cond delay="0"/>
+                                  </p:stCondLst>
+                                  <p:childTnLst>
+                                    <p:set>
+                                      <p:cBhvr>
+                                        <p:cTn id="14" dur="1" fill="hold">
+                                          <p:stCondLst>
+                                            <p:cond delay="0"/>
+                                          </p:stCondLst>
+                                        </p:cTn>
+                                        <p:tgtEl>
+                                          <p:spTgt spid="3">
+                                            <p:txEl>
+                                              <p:pRg st="3" end="3"/>
+                                            </p:txEl>
+                                          </p:spTgt>
+                                        </p:tgtEl>
+                                        <p:attrNameLst>
+                                          <p:attrName>style.visibility</p:attrName>
+                                        </p:attrNameLst>
+                                      </p:cBhvr>
+                                      <p:to>
+                                        <p:strVal val="visible"/>
+                                      </p:to>
+                                    </p:set>
+                                  </p:childTnLst>
+                                </p:cTn>
+                              </p:par>
+                              <p:par>
+                                <p:cTn id="15" presetID="1" presetClass="entr" presetSubtype="0" fill="hold" grpId="0" nodeType="withEffect">
+                                  <p:stCondLst>
+                                    <p:cond delay="0"/>
+                                  </p:stCondLst>
+                                  <p:childTnLst>
+                                    <p:set>
+                                      <p:cBhvr>
+                                        <p:cTn id="16" dur="1" fill="hold">
+                                          <p:stCondLst>
+                                            <p:cond delay="0"/>
+                                          </p:stCondLst>
+                                        </p:cTn>
+                                        <p:tgtEl>
+                                          <p:spTgt spid="3">
+                                            <p:txEl>
+                                              <p:pRg st="4" end="4"/>
+                                            </p:txEl>
+                                          </p:spTgt>
+                                        </p:tgtEl>
+                                        <p:attrNameLst>
+                                          <p:attrName>style.visibility</p:attrName>
+                                        </p:attrNameLst>
+                                      </p:cBhvr>
+                                      <p:to>
+                                        <p:strVal val="visible"/>
+                                      </p:to>
+                                    </p:set>
+                                  </p:childTnLst>
+                                </p:cTn>
+                              </p:par>
+                            </p:childTnLst>
+                          </p:cTn>
+                        </p:par>
+                      </p:childTnLst>
+                    </p:cTn>
+                  </p:par>
+                  <p:par>
+                    <p:cTn id="17" fill="hold">
+                      <p:stCondLst>
+                        <p:cond delay="indefinite"/>
+                      </p:stCondLst>
+                      <p:childTnLst>
+                        <p:par>
+                          <p:cTn id="18" fill="hold">
+                            <p:stCondLst>
+                              <p:cond delay="0"/>
+                            </p:stCondLst>
+                            <p:childTnLst>
+                              <p:par>
+                                <p:cTn id="19" presetID="1" presetClass="entr" presetSubtype="0" fill="hold" grpId="0" nodeType="clickEffect">
+                                  <p:stCondLst>
+                                    <p:cond delay="0"/>
+                                  </p:stCondLst>
+                                  <p:childTnLst>
+                                    <p:set>
+                                      <p:cBhvr>
+                                        <p:cTn id="20" dur="1" fill="hold">
+                                          <p:stCondLst>
+                                            <p:cond delay="0"/>
+                                          </p:stCondLst>
+                                        </p:cTn>
+                                        <p:tgtEl>
+                                          <p:spTgt spid="3">
+                                            <p:txEl>
+                                              <p:pRg st="5" end="5"/>
+                                            </p:txEl>
+                                          </p:spTgt>
+                                        </p:tgtEl>
+                                        <p:attrNameLst>
+                                          <p:attrName>style.visibility</p:attrName>
+                                        </p:attrNameLst>
+                                      </p:cBhvr>
+                                      <p:to>
+                                        <p:strVal val="visible"/>
+                                      </p:to>
+                                    </p:set>
+                                  </p:childTnLst>
+                                </p:cTn>
+                              </p:par>
+                            </p:childTnLst>
+                          </p:cTn>
+                        </p:par>
+                      </p:childTnLst>
+                    </p:cTn>
+                  </p:par>
+                </p:childTnLst>
+              </p:cTn>
+              <p:prevCondLst>
+                <p:cond evt="onPrev" delay="0">
+                  <p:tgtEl>
+                    <p:sldTgt/>
+                  </p:tgtEl>
+                </p:cond>
+              </p:prevCondLst>
+              <p:nextCondLst>
+                <p:cond evt="onNext" delay="0">
+                  <p:tgtEl>
+                    <p:sldTgt/>
+                  </p:tgtEl>
+                </p:cond>
+              </p:nextCondLst>
+            </p:seq>
+          </p:childTnLst>
+        </p:cTn>
+      </p:par>
+    </p:tnLst>
+    <p:bldLst>
+      <p:bldP spid="3" grpId="0" build="p"/>
+    </p:bldLst>
+  </p:timing>
+</p:sld>
+</file>
+
+<file path=ppt/slides/slide30.xml><?xml version="1.0" encoding="utf-8"?>
 <p:sld xmlns:a="http://schemas.openxmlformats.org/drawingml/2006/main" xmlns:r="http://schemas.openxmlformats.org/officeDocument/2006/relationships" xmlns:p="http://schemas.openxmlformats.org/presentationml/2006/main">
   <p:cSld>
     <p:spTree>
@@ -22612,429 +23405,7 @@
 </p:sld>
 </file>
 
-<file path=ppt/slides/slide3.xml><?xml version="1.0" encoding="utf-8"?>
-<p:sld xmlns:a="http://schemas.openxmlformats.org/drawingml/2006/main" xmlns:r="http://schemas.openxmlformats.org/officeDocument/2006/relationships" xmlns:p="http://schemas.openxmlformats.org/presentationml/2006/main">
-  <p:cSld>
-    <p:spTree>
-      <p:nvGrpSpPr>
-        <p:cNvPr id="1" name=""/>
-        <p:cNvGrpSpPr/>
-        <p:nvPr/>
-      </p:nvGrpSpPr>
-      <p:grpSpPr>
-        <a:xfrm>
-          <a:off x="0" y="0"/>
-          <a:ext cx="0" cy="0"/>
-          <a:chOff x="0" y="0"/>
-          <a:chExt cx="0" cy="0"/>
-        </a:xfrm>
-      </p:grpSpPr>
-      <p:sp>
-        <p:nvSpPr>
-          <p:cNvPr id="2" name="Title 1"/>
-          <p:cNvSpPr>
-            <a:spLocks noGrp="1"/>
-          </p:cNvSpPr>
-          <p:nvPr>
-            <p:ph type="title"/>
-          </p:nvPr>
-        </p:nvSpPr>
-        <p:spPr/>
-        <p:txBody>
-          <a:bodyPr/>
-          <a:lstStyle/>
-          <a:p>
-            <a:r>
-              <a:rPr lang="en-US" dirty="0" smtClean="0"/>
-              <a:t>Keeping State data and Functions Separate</a:t>
-            </a:r>
-            <a:endParaRPr lang="en-US" dirty="0"/>
-          </a:p>
-        </p:txBody>
-      </p:sp>
-      <p:sp>
-        <p:nvSpPr>
-          <p:cNvPr id="3" name="Content Placeholder 2"/>
-          <p:cNvSpPr>
-            <a:spLocks noGrp="1"/>
-          </p:cNvSpPr>
-          <p:nvPr>
-            <p:ph idx="1"/>
-          </p:nvPr>
-        </p:nvSpPr>
-        <p:spPr>
-          <a:xfrm>
-            <a:off x="1141412" y="2249487"/>
-            <a:ext cx="10260013" cy="4237038"/>
-          </a:xfrm>
-        </p:spPr>
-        <p:txBody>
-          <a:bodyPr>
-            <a:normAutofit/>
-          </a:bodyPr>
-          <a:lstStyle/>
-          <a:p>
-            <a:r>
-              <a:rPr lang="en-US" dirty="0" smtClean="0"/>
-              <a:t>Current </a:t>
-            </a:r>
-            <a:r>
-              <a:rPr lang="en-US" dirty="0" smtClean="0"/>
-              <a:t>best practice Object Oriented </a:t>
-            </a:r>
-            <a:r>
-              <a:rPr lang="en-US" dirty="0" smtClean="0"/>
-              <a:t>Programming </a:t>
-            </a:r>
-            <a:r>
-              <a:rPr lang="en-US" dirty="0" smtClean="0"/>
-              <a:t>design </a:t>
-            </a:r>
-            <a:r>
-              <a:rPr lang="en-US" dirty="0" smtClean="0"/>
-              <a:t>mixes program state and program functionality by default</a:t>
-            </a:r>
-          </a:p>
-          <a:p>
-            <a:r>
-              <a:rPr lang="en-US" dirty="0" smtClean="0"/>
-              <a:t>Mixing program state with </a:t>
-            </a:r>
-            <a:r>
-              <a:rPr lang="en-US" dirty="0" smtClean="0"/>
-              <a:t>functions:</a:t>
-            </a:r>
-          </a:p>
-          <a:p>
-            <a:pPr lvl="1"/>
-            <a:r>
-              <a:rPr lang="en-US" dirty="0" smtClean="0"/>
-              <a:t>makes testing difficult because program state must be simulated</a:t>
-            </a:r>
-          </a:p>
-          <a:p>
-            <a:pPr lvl="1"/>
-            <a:r>
-              <a:rPr lang="en-US" dirty="0" smtClean="0"/>
-              <a:t>creates </a:t>
-            </a:r>
-            <a:r>
-              <a:rPr lang="en-US" dirty="0" smtClean="0"/>
-              <a:t>unpredictable errors at unexpected </a:t>
-            </a:r>
-            <a:r>
-              <a:rPr lang="en-US" dirty="0" smtClean="0"/>
-              <a:t>times</a:t>
-            </a:r>
-          </a:p>
-          <a:p>
-            <a:pPr lvl="1"/>
-            <a:r>
-              <a:rPr lang="en-US" dirty="0" smtClean="0"/>
-              <a:t>changes in one part of your program can unexpectedly break other parts</a:t>
-            </a:r>
-            <a:endParaRPr lang="en-US" dirty="0"/>
-          </a:p>
-          <a:p>
-            <a:r>
-              <a:rPr lang="en-US" dirty="0" smtClean="0"/>
-              <a:t>If the only information </a:t>
-            </a:r>
-            <a:r>
-              <a:rPr lang="en-US" dirty="0" smtClean="0"/>
-              <a:t>functions can access is the API, these issues are mitigated</a:t>
-            </a:r>
-            <a:endParaRPr lang="en-US" dirty="0" smtClean="0"/>
-          </a:p>
-        </p:txBody>
-      </p:sp>
-    </p:spTree>
-    <p:extLst>
-      <p:ext uri="{BB962C8B-B14F-4D97-AF65-F5344CB8AC3E}">
-        <p14:creationId xmlns:p14="http://schemas.microsoft.com/office/powerpoint/2010/main" val="2594013615"/>
-      </p:ext>
-    </p:extLst>
-  </p:cSld>
-  <p:clrMapOvr>
-    <a:masterClrMapping/>
-  </p:clrMapOvr>
-  <p:timing>
-    <p:tnLst>
-      <p:par>
-        <p:cTn id="1" dur="indefinite" restart="never" nodeType="tmRoot">
-          <p:childTnLst>
-            <p:seq concurrent="1" nextAc="seek">
-              <p:cTn id="2" dur="indefinite" nodeType="mainSeq">
-                <p:childTnLst>
-                  <p:par>
-                    <p:cTn id="3" fill="hold">
-                      <p:stCondLst>
-                        <p:cond delay="indefinite"/>
-                      </p:stCondLst>
-                      <p:childTnLst>
-                        <p:par>
-                          <p:cTn id="4" fill="hold">
-                            <p:stCondLst>
-                              <p:cond delay="0"/>
-                            </p:stCondLst>
-                            <p:childTnLst>
-                              <p:par>
-                                <p:cTn id="5" presetID="1" presetClass="entr" presetSubtype="0" fill="hold" grpId="0" nodeType="clickEffect">
-                                  <p:stCondLst>
-                                    <p:cond delay="0"/>
-                                  </p:stCondLst>
-                                  <p:childTnLst>
-                                    <p:set>
-                                      <p:cBhvr>
-                                        <p:cTn id="6" dur="1" fill="hold">
-                                          <p:stCondLst>
-                                            <p:cond delay="0"/>
-                                          </p:stCondLst>
-                                        </p:cTn>
-                                        <p:tgtEl>
-                                          <p:spTgt spid="3">
-                                            <p:txEl>
-                                              <p:pRg st="0" end="0"/>
-                                            </p:txEl>
-                                          </p:spTgt>
-                                        </p:tgtEl>
-                                        <p:attrNameLst>
-                                          <p:attrName>style.visibility</p:attrName>
-                                        </p:attrNameLst>
-                                      </p:cBhvr>
-                                      <p:to>
-                                        <p:strVal val="visible"/>
-                                      </p:to>
-                                    </p:set>
-                                  </p:childTnLst>
-                                </p:cTn>
-                              </p:par>
-                            </p:childTnLst>
-                          </p:cTn>
-                        </p:par>
-                      </p:childTnLst>
-                    </p:cTn>
-                  </p:par>
-                  <p:par>
-                    <p:cTn id="7" fill="hold">
-                      <p:stCondLst>
-                        <p:cond delay="indefinite"/>
-                      </p:stCondLst>
-                      <p:childTnLst>
-                        <p:par>
-                          <p:cTn id="8" fill="hold">
-                            <p:stCondLst>
-                              <p:cond delay="0"/>
-                            </p:stCondLst>
-                            <p:childTnLst>
-                              <p:par>
-                                <p:cTn id="9" presetID="1" presetClass="entr" presetSubtype="0" fill="hold" grpId="0" nodeType="clickEffect">
-                                  <p:stCondLst>
-                                    <p:cond delay="0"/>
-                                  </p:stCondLst>
-                                  <p:childTnLst>
-                                    <p:set>
-                                      <p:cBhvr>
-                                        <p:cTn id="10" dur="1" fill="hold">
-                                          <p:stCondLst>
-                                            <p:cond delay="0"/>
-                                          </p:stCondLst>
-                                        </p:cTn>
-                                        <p:tgtEl>
-                                          <p:spTgt spid="3">
-                                            <p:txEl>
-                                              <p:pRg st="1" end="1"/>
-                                            </p:txEl>
-                                          </p:spTgt>
-                                        </p:tgtEl>
-                                        <p:attrNameLst>
-                                          <p:attrName>style.visibility</p:attrName>
-                                        </p:attrNameLst>
-                                      </p:cBhvr>
-                                      <p:to>
-                                        <p:strVal val="visible"/>
-                                      </p:to>
-                                    </p:set>
-                                  </p:childTnLst>
-                                </p:cTn>
-                              </p:par>
-                              <p:par>
-                                <p:cTn id="11" presetID="1" presetClass="entr" presetSubtype="0" fill="hold" grpId="0" nodeType="withEffect">
-                                  <p:stCondLst>
-                                    <p:cond delay="0"/>
-                                  </p:stCondLst>
-                                  <p:childTnLst>
-                                    <p:set>
-                                      <p:cBhvr>
-                                        <p:cTn id="12" dur="1" fill="hold">
-                                          <p:stCondLst>
-                                            <p:cond delay="0"/>
-                                          </p:stCondLst>
-                                        </p:cTn>
-                                        <p:tgtEl>
-                                          <p:spTgt spid="3">
-                                            <p:txEl>
-                                              <p:pRg st="2" end="2"/>
-                                            </p:txEl>
-                                          </p:spTgt>
-                                        </p:tgtEl>
-                                        <p:attrNameLst>
-                                          <p:attrName>style.visibility</p:attrName>
-                                        </p:attrNameLst>
-                                      </p:cBhvr>
-                                      <p:to>
-                                        <p:strVal val="visible"/>
-                                      </p:to>
-                                    </p:set>
-                                  </p:childTnLst>
-                                </p:cTn>
-                              </p:par>
-                              <p:par>
-                                <p:cTn id="13" presetID="1" presetClass="entr" presetSubtype="0" fill="hold" grpId="0" nodeType="withEffect">
-                                  <p:stCondLst>
-                                    <p:cond delay="0"/>
-                                  </p:stCondLst>
-                                  <p:childTnLst>
-                                    <p:set>
-                                      <p:cBhvr>
-                                        <p:cTn id="14" dur="1" fill="hold">
-                                          <p:stCondLst>
-                                            <p:cond delay="0"/>
-                                          </p:stCondLst>
-                                        </p:cTn>
-                                        <p:tgtEl>
-                                          <p:spTgt spid="3">
-                                            <p:txEl>
-                                              <p:pRg st="3" end="3"/>
-                                            </p:txEl>
-                                          </p:spTgt>
-                                        </p:tgtEl>
-                                        <p:attrNameLst>
-                                          <p:attrName>style.visibility</p:attrName>
-                                        </p:attrNameLst>
-                                      </p:cBhvr>
-                                      <p:to>
-                                        <p:strVal val="visible"/>
-                                      </p:to>
-                                    </p:set>
-                                  </p:childTnLst>
-                                </p:cTn>
-                              </p:par>
-                              <p:par>
-                                <p:cTn id="15" presetID="1" presetClass="entr" presetSubtype="0" fill="hold" grpId="0" nodeType="withEffect">
-                                  <p:stCondLst>
-                                    <p:cond delay="0"/>
-                                  </p:stCondLst>
-                                  <p:childTnLst>
-                                    <p:set>
-                                      <p:cBhvr>
-                                        <p:cTn id="16" dur="1" fill="hold">
-                                          <p:stCondLst>
-                                            <p:cond delay="0"/>
-                                          </p:stCondLst>
-                                        </p:cTn>
-                                        <p:tgtEl>
-                                          <p:spTgt spid="3">
-                                            <p:txEl>
-                                              <p:pRg st="4" end="4"/>
-                                            </p:txEl>
-                                          </p:spTgt>
-                                        </p:tgtEl>
-                                        <p:attrNameLst>
-                                          <p:attrName>style.visibility</p:attrName>
-                                        </p:attrNameLst>
-                                      </p:cBhvr>
-                                      <p:to>
-                                        <p:strVal val="visible"/>
-                                      </p:to>
-                                    </p:set>
-                                  </p:childTnLst>
-                                </p:cTn>
-                              </p:par>
-                            </p:childTnLst>
-                          </p:cTn>
-                        </p:par>
-                      </p:childTnLst>
-                    </p:cTn>
-                  </p:par>
-                  <p:par>
-                    <p:cTn id="17" fill="hold">
-                      <p:stCondLst>
-                        <p:cond delay="indefinite"/>
-                      </p:stCondLst>
-                      <p:childTnLst>
-                        <p:par>
-                          <p:cTn id="18" fill="hold">
-                            <p:stCondLst>
-                              <p:cond delay="0"/>
-                            </p:stCondLst>
-                            <p:childTnLst>
-                              <p:par>
-                                <p:cTn id="19" presetID="1" presetClass="entr" presetSubtype="0" fill="hold" grpId="0" nodeType="clickEffect">
-                                  <p:stCondLst>
-                                    <p:cond delay="0"/>
-                                  </p:stCondLst>
-                                  <p:childTnLst>
-                                    <p:set>
-                                      <p:cBhvr>
-                                        <p:cTn id="20" dur="1" fill="hold">
-                                          <p:stCondLst>
-                                            <p:cond delay="0"/>
-                                          </p:stCondLst>
-                                        </p:cTn>
-                                        <p:tgtEl>
-                                          <p:spTgt spid="3">
-                                            <p:txEl>
-                                              <p:pRg st="5" end="5"/>
-                                            </p:txEl>
-                                          </p:spTgt>
-                                        </p:tgtEl>
-                                        <p:attrNameLst>
-                                          <p:attrName>style.visibility</p:attrName>
-                                        </p:attrNameLst>
-                                      </p:cBhvr>
-                                      <p:to>
-                                        <p:strVal val="visible"/>
-                                      </p:to>
-                                    </p:set>
-                                  </p:childTnLst>
-                                </p:cTn>
-                              </p:par>
-                            </p:childTnLst>
-                          </p:cTn>
-                        </p:par>
-                      </p:childTnLst>
-                    </p:cTn>
-                  </p:par>
-                </p:childTnLst>
-              </p:cTn>
-              <p:prevCondLst>
-                <p:cond evt="onPrev" delay="0">
-                  <p:tgtEl>
-                    <p:sldTgt/>
-                  </p:tgtEl>
-                </p:cond>
-              </p:prevCondLst>
-              <p:nextCondLst>
-                <p:cond evt="onNext" delay="0">
-                  <p:tgtEl>
-                    <p:sldTgt/>
-                  </p:tgtEl>
-                </p:cond>
-              </p:nextCondLst>
-            </p:seq>
-          </p:childTnLst>
-        </p:cTn>
-      </p:par>
-    </p:tnLst>
-    <p:bldLst>
-      <p:bldP spid="3" grpId="0" build="p"/>
-    </p:bldLst>
-  </p:timing>
-</p:sld>
-</file>
-
-<file path=ppt/slides/slide30.xml><?xml version="1.0" encoding="utf-8"?>
+<file path=ppt/slides/slide31.xml><?xml version="1.0" encoding="utf-8"?>
 <p:sld xmlns:a="http://schemas.openxmlformats.org/drawingml/2006/main" xmlns:r="http://schemas.openxmlformats.org/officeDocument/2006/relationships" xmlns:p="http://schemas.openxmlformats.org/presentationml/2006/main">
   <p:cSld>
     <p:spTree>
@@ -25377,7 +25748,7 @@
 </p:sld>
 </file>
 
-<file path=ppt/slides/slide31.xml><?xml version="1.0" encoding="utf-8"?>
+<file path=ppt/slides/slide32.xml><?xml version="1.0" encoding="utf-8"?>
 <p:sld xmlns:a="http://schemas.openxmlformats.org/drawingml/2006/main" xmlns:r="http://schemas.openxmlformats.org/officeDocument/2006/relationships" xmlns:p="http://schemas.openxmlformats.org/presentationml/2006/main">
   <p:cSld>
     <p:spTree>
@@ -27222,7 +27593,7 @@
 </p:sld>
 </file>
 
-<file path=ppt/slides/slide32.xml><?xml version="1.0" encoding="utf-8"?>
+<file path=ppt/slides/slide33.xml><?xml version="1.0" encoding="utf-8"?>
 <p:sld xmlns:a="http://schemas.openxmlformats.org/drawingml/2006/main" xmlns:r="http://schemas.openxmlformats.org/officeDocument/2006/relationships" xmlns:p="http://schemas.openxmlformats.org/presentationml/2006/main">
   <p:cSld>
     <p:spTree>
@@ -28932,7 +29303,7 @@
 </p:sld>
 </file>
 
-<file path=ppt/slides/slide33.xml><?xml version="1.0" encoding="utf-8"?>
+<file path=ppt/slides/slide34.xml><?xml version="1.0" encoding="utf-8"?>
 <p:sld xmlns:a="http://schemas.openxmlformats.org/drawingml/2006/main" xmlns:r="http://schemas.openxmlformats.org/officeDocument/2006/relationships" xmlns:p="http://schemas.openxmlformats.org/presentationml/2006/main">
   <p:cSld>
     <p:spTree>
@@ -31245,7 +31616,7 @@
 </p:sld>
 </file>
 
-<file path=ppt/slides/slide34.xml><?xml version="1.0" encoding="utf-8"?>
+<file path=ppt/slides/slide35.xml><?xml version="1.0" encoding="utf-8"?>
 <p:sld xmlns:a="http://schemas.openxmlformats.org/drawingml/2006/main" xmlns:r="http://schemas.openxmlformats.org/officeDocument/2006/relationships" xmlns:p="http://schemas.openxmlformats.org/presentationml/2006/main" show="0">
   <p:cSld>
     <p:spTree>
@@ -34402,7 +34773,7 @@
 </p:sld>
 </file>
 
-<file path=ppt/slides/slide35.xml><?xml version="1.0" encoding="utf-8"?>
+<file path=ppt/slides/slide36.xml><?xml version="1.0" encoding="utf-8"?>
 <p:sld xmlns:a="http://schemas.openxmlformats.org/drawingml/2006/main" xmlns:r="http://schemas.openxmlformats.org/officeDocument/2006/relationships" xmlns:p="http://schemas.openxmlformats.org/presentationml/2006/main">
   <p:cSld>
     <p:spTree>

</xml_diff>

<commit_message>
more fixes to powerpoint again2
</commit_message>
<xml_diff>
--- a/DFC3.pptx
+++ b/DFC3.pptx
@@ -12424,7 +12424,7 @@
         </p:spPr>
         <p:txBody>
           <a:bodyPr>
-            <a:normAutofit fontScale="77500" lnSpcReduction="20000"/>
+            <a:normAutofit fontScale="92500" lnSpcReduction="20000"/>
           </a:bodyPr>
           <a:lstStyle/>
           <a:p>
@@ -12442,7 +12442,11 @@
             </a:r>
             <a:r>
               <a:rPr lang="en-US" dirty="0" smtClean="0"/>
-              <a:t>PROGRAMS WITH simple and efficient concurrency, strongly testable functions, and separation of data and functions</a:t>
+              <a:t>Better Programs</a:t>
+            </a:r>
+            <a:r>
+              <a:rPr lang="en-US" dirty="0" smtClean="0"/>
+              <a:t/>
             </a:r>
             <a:br>
               <a:rPr lang="en-US" dirty="0" smtClean="0"/>

</xml_diff>

<commit_message>
more fixes to powerpoint again3
</commit_message>
<xml_diff>
--- a/DFC3.pptx
+++ b/DFC3.pptx
@@ -8,8 +8,8 @@
     <p:sldId id="256" r:id="rId2"/>
     <p:sldId id="263" r:id="rId3"/>
     <p:sldId id="265" r:id="rId4"/>
-    <p:sldId id="264" r:id="rId5"/>
-    <p:sldId id="266" r:id="rId6"/>
+    <p:sldId id="266" r:id="rId5"/>
+    <p:sldId id="264" r:id="rId6"/>
     <p:sldId id="267" r:id="rId7"/>
     <p:sldId id="259" r:id="rId8"/>
     <p:sldId id="258" r:id="rId9"/>
@@ -34871,274 +34871,6 @@
           <a:p>
             <a:r>
               <a:rPr lang="en-US" dirty="0" smtClean="0"/>
-              <a:t>Keep it simple stupid</a:t>
-            </a:r>
-            <a:endParaRPr lang="en-US" dirty="0"/>
-          </a:p>
-        </p:txBody>
-      </p:sp>
-      <p:sp>
-        <p:nvSpPr>
-          <p:cNvPr id="3" name="Content Placeholder 2"/>
-          <p:cNvSpPr>
-            <a:spLocks noGrp="1"/>
-          </p:cNvSpPr>
-          <p:nvPr>
-            <p:ph idx="1"/>
-          </p:nvPr>
-        </p:nvSpPr>
-        <p:spPr/>
-        <p:txBody>
-          <a:bodyPr/>
-          <a:lstStyle/>
-          <a:p>
-            <a:r>
-              <a:rPr lang="en-US" dirty="0" smtClean="0"/>
-              <a:t>The first step to solving a complex problem is to break it into pieces</a:t>
-            </a:r>
-          </a:p>
-          <a:p>
-            <a:r>
-              <a:rPr lang="en-US" dirty="0" smtClean="0"/>
-              <a:t>The DFC3 library allows code to be broken into separate Data and Functionality areas.</a:t>
-            </a:r>
-          </a:p>
-          <a:p>
-            <a:r>
-              <a:rPr lang="en-US" dirty="0" smtClean="0"/>
-              <a:t>DFC3 hooks the realms of Data and Functionality together with powerful concurrent, multithreading techniques</a:t>
-            </a:r>
-            <a:endParaRPr lang="en-US" dirty="0"/>
-          </a:p>
-        </p:txBody>
-      </p:sp>
-    </p:spTree>
-    <p:extLst>
-      <p:ext uri="{BB962C8B-B14F-4D97-AF65-F5344CB8AC3E}">
-        <p14:creationId xmlns:p14="http://schemas.microsoft.com/office/powerpoint/2010/main" val="2809141946"/>
-      </p:ext>
-    </p:extLst>
-  </p:cSld>
-  <p:clrMapOvr>
-    <a:masterClrMapping/>
-  </p:clrMapOvr>
-  <p:timing>
-    <p:tnLst>
-      <p:par>
-        <p:cTn id="1" dur="indefinite" restart="never" nodeType="tmRoot">
-          <p:childTnLst>
-            <p:seq concurrent="1" nextAc="seek">
-              <p:cTn id="2" dur="indefinite" nodeType="mainSeq">
-                <p:childTnLst>
-                  <p:par>
-                    <p:cTn id="3" fill="hold">
-                      <p:stCondLst>
-                        <p:cond delay="indefinite"/>
-                      </p:stCondLst>
-                      <p:childTnLst>
-                        <p:par>
-                          <p:cTn id="4" fill="hold">
-                            <p:stCondLst>
-                              <p:cond delay="0"/>
-                            </p:stCondLst>
-                            <p:childTnLst>
-                              <p:par>
-                                <p:cTn id="5" presetID="1" presetClass="entr" presetSubtype="0" fill="hold" grpId="0" nodeType="clickEffect">
-                                  <p:stCondLst>
-                                    <p:cond delay="0"/>
-                                  </p:stCondLst>
-                                  <p:childTnLst>
-                                    <p:set>
-                                      <p:cBhvr>
-                                        <p:cTn id="6" dur="1" fill="hold">
-                                          <p:stCondLst>
-                                            <p:cond delay="0"/>
-                                          </p:stCondLst>
-                                        </p:cTn>
-                                        <p:tgtEl>
-                                          <p:spTgt spid="3">
-                                            <p:txEl>
-                                              <p:pRg st="0" end="0"/>
-                                            </p:txEl>
-                                          </p:spTgt>
-                                        </p:tgtEl>
-                                        <p:attrNameLst>
-                                          <p:attrName>style.visibility</p:attrName>
-                                        </p:attrNameLst>
-                                      </p:cBhvr>
-                                      <p:to>
-                                        <p:strVal val="visible"/>
-                                      </p:to>
-                                    </p:set>
-                                  </p:childTnLst>
-                                </p:cTn>
-                              </p:par>
-                            </p:childTnLst>
-                          </p:cTn>
-                        </p:par>
-                      </p:childTnLst>
-                    </p:cTn>
-                  </p:par>
-                  <p:par>
-                    <p:cTn id="7" fill="hold">
-                      <p:stCondLst>
-                        <p:cond delay="indefinite"/>
-                      </p:stCondLst>
-                      <p:childTnLst>
-                        <p:par>
-                          <p:cTn id="8" fill="hold">
-                            <p:stCondLst>
-                              <p:cond delay="0"/>
-                            </p:stCondLst>
-                            <p:childTnLst>
-                              <p:par>
-                                <p:cTn id="9" presetID="1" presetClass="entr" presetSubtype="0" fill="hold" grpId="0" nodeType="clickEffect">
-                                  <p:stCondLst>
-                                    <p:cond delay="0"/>
-                                  </p:stCondLst>
-                                  <p:childTnLst>
-                                    <p:set>
-                                      <p:cBhvr>
-                                        <p:cTn id="10" dur="1" fill="hold">
-                                          <p:stCondLst>
-                                            <p:cond delay="0"/>
-                                          </p:stCondLst>
-                                        </p:cTn>
-                                        <p:tgtEl>
-                                          <p:spTgt spid="3">
-                                            <p:txEl>
-                                              <p:pRg st="1" end="1"/>
-                                            </p:txEl>
-                                          </p:spTgt>
-                                        </p:tgtEl>
-                                        <p:attrNameLst>
-                                          <p:attrName>style.visibility</p:attrName>
-                                        </p:attrNameLst>
-                                      </p:cBhvr>
-                                      <p:to>
-                                        <p:strVal val="visible"/>
-                                      </p:to>
-                                    </p:set>
-                                  </p:childTnLst>
-                                </p:cTn>
-                              </p:par>
-                            </p:childTnLst>
-                          </p:cTn>
-                        </p:par>
-                      </p:childTnLst>
-                    </p:cTn>
-                  </p:par>
-                  <p:par>
-                    <p:cTn id="11" fill="hold">
-                      <p:stCondLst>
-                        <p:cond delay="indefinite"/>
-                      </p:stCondLst>
-                      <p:childTnLst>
-                        <p:par>
-                          <p:cTn id="12" fill="hold">
-                            <p:stCondLst>
-                              <p:cond delay="0"/>
-                            </p:stCondLst>
-                            <p:childTnLst>
-                              <p:par>
-                                <p:cTn id="13" presetID="1" presetClass="entr" presetSubtype="0" fill="hold" grpId="0" nodeType="clickEffect">
-                                  <p:stCondLst>
-                                    <p:cond delay="0"/>
-                                  </p:stCondLst>
-                                  <p:childTnLst>
-                                    <p:set>
-                                      <p:cBhvr>
-                                        <p:cTn id="14" dur="1" fill="hold">
-                                          <p:stCondLst>
-                                            <p:cond delay="0"/>
-                                          </p:stCondLst>
-                                        </p:cTn>
-                                        <p:tgtEl>
-                                          <p:spTgt spid="3">
-                                            <p:txEl>
-                                              <p:pRg st="2" end="2"/>
-                                            </p:txEl>
-                                          </p:spTgt>
-                                        </p:tgtEl>
-                                        <p:attrNameLst>
-                                          <p:attrName>style.visibility</p:attrName>
-                                        </p:attrNameLst>
-                                      </p:cBhvr>
-                                      <p:to>
-                                        <p:strVal val="visible"/>
-                                      </p:to>
-                                    </p:set>
-                                  </p:childTnLst>
-                                </p:cTn>
-                              </p:par>
-                            </p:childTnLst>
-                          </p:cTn>
-                        </p:par>
-                      </p:childTnLst>
-                    </p:cTn>
-                  </p:par>
-                </p:childTnLst>
-              </p:cTn>
-              <p:prevCondLst>
-                <p:cond evt="onPrev" delay="0">
-                  <p:tgtEl>
-                    <p:sldTgt/>
-                  </p:tgtEl>
-                </p:cond>
-              </p:prevCondLst>
-              <p:nextCondLst>
-                <p:cond evt="onNext" delay="0">
-                  <p:tgtEl>
-                    <p:sldTgt/>
-                  </p:tgtEl>
-                </p:cond>
-              </p:nextCondLst>
-            </p:seq>
-          </p:childTnLst>
-        </p:cTn>
-      </p:par>
-    </p:tnLst>
-    <p:bldLst>
-      <p:bldP spid="3" grpId="0" build="p"/>
-    </p:bldLst>
-  </p:timing>
-</p:sld>
-</file>
-
-<file path=ppt/slides/slide5.xml><?xml version="1.0" encoding="utf-8"?>
-<p:sld xmlns:a="http://schemas.openxmlformats.org/drawingml/2006/main" xmlns:r="http://schemas.openxmlformats.org/officeDocument/2006/relationships" xmlns:p="http://schemas.openxmlformats.org/presentationml/2006/main">
-  <p:cSld>
-    <p:spTree>
-      <p:nvGrpSpPr>
-        <p:cNvPr id="1" name=""/>
-        <p:cNvGrpSpPr/>
-        <p:nvPr/>
-      </p:nvGrpSpPr>
-      <p:grpSpPr>
-        <a:xfrm>
-          <a:off x="0" y="0"/>
-          <a:ext cx="0" cy="0"/>
-          <a:chOff x="0" y="0"/>
-          <a:chExt cx="0" cy="0"/>
-        </a:xfrm>
-      </p:grpSpPr>
-      <p:sp>
-        <p:nvSpPr>
-          <p:cNvPr id="2" name="Title 1"/>
-          <p:cNvSpPr>
-            <a:spLocks noGrp="1"/>
-          </p:cNvSpPr>
-          <p:nvPr>
-            <p:ph type="title"/>
-          </p:nvPr>
-        </p:nvSpPr>
-        <p:spPr/>
-        <p:txBody>
-          <a:bodyPr/>
-          <a:lstStyle/>
-          <a:p>
-            <a:r>
-              <a:rPr lang="en-US" dirty="0" smtClean="0"/>
               <a:t>Concurrent programming is necessary but dangerous in many languages</a:t>
             </a:r>
             <a:endParaRPr lang="en-US" dirty="0"/>
@@ -35580,6 +35312,343 @@
                                           <p:spTgt spid="3">
                                             <p:txEl>
                                               <p:pRg st="8" end="8"/>
+                                            </p:txEl>
+                                          </p:spTgt>
+                                        </p:tgtEl>
+                                        <p:attrNameLst>
+                                          <p:attrName>style.visibility</p:attrName>
+                                        </p:attrNameLst>
+                                      </p:cBhvr>
+                                      <p:to>
+                                        <p:strVal val="visible"/>
+                                      </p:to>
+                                    </p:set>
+                                  </p:childTnLst>
+                                </p:cTn>
+                              </p:par>
+                            </p:childTnLst>
+                          </p:cTn>
+                        </p:par>
+                      </p:childTnLst>
+                    </p:cTn>
+                  </p:par>
+                </p:childTnLst>
+              </p:cTn>
+              <p:prevCondLst>
+                <p:cond evt="onPrev" delay="0">
+                  <p:tgtEl>
+                    <p:sldTgt/>
+                  </p:tgtEl>
+                </p:cond>
+              </p:prevCondLst>
+              <p:nextCondLst>
+                <p:cond evt="onNext" delay="0">
+                  <p:tgtEl>
+                    <p:sldTgt/>
+                  </p:tgtEl>
+                </p:cond>
+              </p:nextCondLst>
+            </p:seq>
+          </p:childTnLst>
+        </p:cTn>
+      </p:par>
+    </p:tnLst>
+    <p:bldLst>
+      <p:bldP spid="3" grpId="0" build="p"/>
+    </p:bldLst>
+  </p:timing>
+</p:sld>
+</file>
+
+<file path=ppt/slides/slide5.xml><?xml version="1.0" encoding="utf-8"?>
+<p:sld xmlns:a="http://schemas.openxmlformats.org/drawingml/2006/main" xmlns:r="http://schemas.openxmlformats.org/officeDocument/2006/relationships" xmlns:p="http://schemas.openxmlformats.org/presentationml/2006/main">
+  <p:cSld>
+    <p:spTree>
+      <p:nvGrpSpPr>
+        <p:cNvPr id="1" name=""/>
+        <p:cNvGrpSpPr/>
+        <p:nvPr/>
+      </p:nvGrpSpPr>
+      <p:grpSpPr>
+        <a:xfrm>
+          <a:off x="0" y="0"/>
+          <a:ext cx="0" cy="0"/>
+          <a:chOff x="0" y="0"/>
+          <a:chExt cx="0" cy="0"/>
+        </a:xfrm>
+      </p:grpSpPr>
+      <p:sp>
+        <p:nvSpPr>
+          <p:cNvPr id="2" name="Title 1"/>
+          <p:cNvSpPr>
+            <a:spLocks noGrp="1"/>
+          </p:cNvSpPr>
+          <p:nvPr>
+            <p:ph type="title"/>
+          </p:nvPr>
+        </p:nvSpPr>
+        <p:spPr/>
+        <p:txBody>
+          <a:bodyPr/>
+          <a:lstStyle/>
+          <a:p>
+            <a:r>
+              <a:rPr lang="en-US" dirty="0" smtClean="0"/>
+              <a:t>Keep it simple stupid</a:t>
+            </a:r>
+            <a:endParaRPr lang="en-US" dirty="0"/>
+          </a:p>
+        </p:txBody>
+      </p:sp>
+      <p:sp>
+        <p:nvSpPr>
+          <p:cNvPr id="3" name="Content Placeholder 2"/>
+          <p:cNvSpPr>
+            <a:spLocks noGrp="1"/>
+          </p:cNvSpPr>
+          <p:nvPr>
+            <p:ph idx="1"/>
+          </p:nvPr>
+        </p:nvSpPr>
+        <p:spPr/>
+        <p:txBody>
+          <a:bodyPr>
+            <a:normAutofit lnSpcReduction="10000"/>
+          </a:bodyPr>
+          <a:lstStyle/>
+          <a:p>
+            <a:r>
+              <a:rPr lang="en-US" dirty="0" smtClean="0"/>
+              <a:t>A lot of the complexity and readability problems are from trying to package too much complexity together</a:t>
+            </a:r>
+          </a:p>
+          <a:p>
+            <a:r>
+              <a:rPr lang="en-US" dirty="0" smtClean="0"/>
+              <a:t>The </a:t>
+            </a:r>
+            <a:r>
+              <a:rPr lang="en-US" dirty="0" smtClean="0"/>
+              <a:t>first step to solving a complex problem is to break it into pieces</a:t>
+            </a:r>
+          </a:p>
+          <a:p>
+            <a:r>
+              <a:rPr lang="en-US" dirty="0" smtClean="0"/>
+              <a:t>The DFC3 library allows code to be broken into separate Data and Functionality areas.</a:t>
+            </a:r>
+          </a:p>
+          <a:p>
+            <a:r>
+              <a:rPr lang="en-US" dirty="0" smtClean="0"/>
+              <a:t>DFC3 hooks the realms of Data and Functionality together with powerful concurrent, </a:t>
+            </a:r>
+            <a:r>
+              <a:rPr lang="en-US" smtClean="0"/>
+              <a:t>multithreading </a:t>
+            </a:r>
+            <a:r>
+              <a:rPr lang="en-US" smtClean="0"/>
+              <a:t>techniques…</a:t>
+            </a:r>
+            <a:endParaRPr lang="en-US" dirty="0"/>
+          </a:p>
+        </p:txBody>
+      </p:sp>
+    </p:spTree>
+    <p:extLst>
+      <p:ext uri="{BB962C8B-B14F-4D97-AF65-F5344CB8AC3E}">
+        <p14:creationId xmlns:p14="http://schemas.microsoft.com/office/powerpoint/2010/main" val="2809141946"/>
+      </p:ext>
+    </p:extLst>
+  </p:cSld>
+  <p:clrMapOvr>
+    <a:masterClrMapping/>
+  </p:clrMapOvr>
+  <p:timing>
+    <p:tnLst>
+      <p:par>
+        <p:cTn id="1" dur="indefinite" restart="never" nodeType="tmRoot">
+          <p:childTnLst>
+            <p:seq concurrent="1" nextAc="seek">
+              <p:cTn id="2" dur="indefinite" nodeType="mainSeq">
+                <p:childTnLst>
+                  <p:par>
+                    <p:cTn id="3" fill="hold">
+                      <p:stCondLst>
+                        <p:cond delay="indefinite"/>
+                      </p:stCondLst>
+                      <p:childTnLst>
+                        <p:par>
+                          <p:cTn id="4" fill="hold">
+                            <p:stCondLst>
+                              <p:cond delay="0"/>
+                            </p:stCondLst>
+                            <p:childTnLst>
+                              <p:par>
+                                <p:cTn id="5" presetID="1" presetClass="entr" presetSubtype="0" fill="hold" grpId="0" nodeType="clickEffect">
+                                  <p:stCondLst>
+                                    <p:cond delay="0"/>
+                                  </p:stCondLst>
+                                  <p:childTnLst>
+                                    <p:set>
+                                      <p:cBhvr>
+                                        <p:cTn id="6" dur="1" fill="hold">
+                                          <p:stCondLst>
+                                            <p:cond delay="0"/>
+                                          </p:stCondLst>
+                                        </p:cTn>
+                                        <p:tgtEl>
+                                          <p:spTgt spid="3">
+                                            <p:txEl>
+                                              <p:pRg st="0" end="0"/>
+                                            </p:txEl>
+                                          </p:spTgt>
+                                        </p:tgtEl>
+                                        <p:attrNameLst>
+                                          <p:attrName>style.visibility</p:attrName>
+                                        </p:attrNameLst>
+                                      </p:cBhvr>
+                                      <p:to>
+                                        <p:strVal val="visible"/>
+                                      </p:to>
+                                    </p:set>
+                                  </p:childTnLst>
+                                </p:cTn>
+                              </p:par>
+                            </p:childTnLst>
+                          </p:cTn>
+                        </p:par>
+                      </p:childTnLst>
+                    </p:cTn>
+                  </p:par>
+                  <p:par>
+                    <p:cTn id="7" fill="hold">
+                      <p:stCondLst>
+                        <p:cond delay="indefinite"/>
+                      </p:stCondLst>
+                      <p:childTnLst>
+                        <p:par>
+                          <p:cTn id="8" fill="hold">
+                            <p:stCondLst>
+                              <p:cond delay="0"/>
+                            </p:stCondLst>
+                            <p:childTnLst>
+                              <p:par>
+                                <p:cTn id="9" presetID="1" presetClass="entr" presetSubtype="0" fill="hold" grpId="0" nodeType="clickEffect">
+                                  <p:stCondLst>
+                                    <p:cond delay="0"/>
+                                  </p:stCondLst>
+                                  <p:childTnLst>
+                                    <p:set>
+                                      <p:cBhvr>
+                                        <p:cTn id="10" dur="1" fill="hold">
+                                          <p:stCondLst>
+                                            <p:cond delay="0"/>
+                                          </p:stCondLst>
+                                        </p:cTn>
+                                        <p:tgtEl>
+                                          <p:spTgt spid="3">
+                                            <p:txEl>
+                                              <p:pRg st="1" end="1"/>
+                                            </p:txEl>
+                                          </p:spTgt>
+                                        </p:tgtEl>
+                                        <p:attrNameLst>
+                                          <p:attrName>style.visibility</p:attrName>
+                                        </p:attrNameLst>
+                                      </p:cBhvr>
+                                      <p:to>
+                                        <p:strVal val="visible"/>
+                                      </p:to>
+                                    </p:set>
+                                  </p:childTnLst>
+                                </p:cTn>
+                              </p:par>
+                            </p:childTnLst>
+                          </p:cTn>
+                        </p:par>
+                      </p:childTnLst>
+                    </p:cTn>
+                  </p:par>
+                  <p:par>
+                    <p:cTn id="11" fill="hold">
+                      <p:stCondLst>
+                        <p:cond delay="indefinite"/>
+                      </p:stCondLst>
+                      <p:childTnLst>
+                        <p:par>
+                          <p:cTn id="12" fill="hold">
+                            <p:stCondLst>
+                              <p:cond delay="0"/>
+                            </p:stCondLst>
+                            <p:childTnLst>
+                              <p:par>
+                                <p:cTn id="13" presetID="1" presetClass="entr" presetSubtype="0" fill="hold" grpId="0" nodeType="clickEffect">
+                                  <p:stCondLst>
+                                    <p:cond delay="0"/>
+                                  </p:stCondLst>
+                                  <p:childTnLst>
+                                    <p:set>
+                                      <p:cBhvr>
+                                        <p:cTn id="14" dur="1" fill="hold">
+                                          <p:stCondLst>
+                                            <p:cond delay="0"/>
+                                          </p:stCondLst>
+                                        </p:cTn>
+                                        <p:tgtEl>
+                                          <p:spTgt spid="3">
+                                            <p:txEl>
+                                              <p:pRg st="2" end="2"/>
+                                            </p:txEl>
+                                          </p:spTgt>
+                                        </p:tgtEl>
+                                        <p:attrNameLst>
+                                          <p:attrName>style.visibility</p:attrName>
+                                        </p:attrNameLst>
+                                      </p:cBhvr>
+                                      <p:to>
+                                        <p:strVal val="visible"/>
+                                      </p:to>
+                                    </p:set>
+                                  </p:childTnLst>
+                                </p:cTn>
+                              </p:par>
+                            </p:childTnLst>
+                          </p:cTn>
+                        </p:par>
+                      </p:childTnLst>
+                    </p:cTn>
+                  </p:par>
+                  <p:par>
+                    <p:cTn id="15" fill="hold">
+                      <p:stCondLst>
+                        <p:cond delay="indefinite"/>
+                      </p:stCondLst>
+                      <p:childTnLst>
+                        <p:par>
+                          <p:cTn id="16" fill="hold">
+                            <p:stCondLst>
+                              <p:cond delay="0"/>
+                            </p:stCondLst>
+                            <p:childTnLst>
+                              <p:par>
+                                <p:cTn id="17" presetID="1" presetClass="entr" presetSubtype="0" fill="hold" grpId="0" nodeType="clickEffect">
+                                  <p:stCondLst>
+                                    <p:cond delay="0"/>
+                                  </p:stCondLst>
+                                  <p:childTnLst>
+                                    <p:set>
+                                      <p:cBhvr>
+                                        <p:cTn id="18" dur="1" fill="hold">
+                                          <p:stCondLst>
+                                            <p:cond delay="0"/>
+                                          </p:stCondLst>
+                                        </p:cTn>
+                                        <p:tgtEl>
+                                          <p:spTgt spid="3">
+                                            <p:txEl>
+                                              <p:pRg st="3" end="3"/>
                                             </p:txEl>
                                           </p:spTgt>
                                         </p:tgtEl>

</xml_diff>